<commit_message>
Gradle-ize examples in slide decks for Spring Boot
</commit_message>
<xml_diff>
--- a/presentations/102 - Intro to Spring Boot/Session_3_Polyglot_Persist.pptx
+++ b/presentations/102 - Intro to Spring Boot/Session_3_Polyglot_Persist.pptx
@@ -248,7 +248,7 @@
           <a:p>
             <a:fld id="{372E5B6B-8713-8747-AE5B-F1241B2BF5F0}" type="datetimeFigureOut">
               <a:rPr lang="en-US" smtClean="0"/>
-              <a:t>8/6/17</a:t>
+              <a:t>10/3/17</a:t>
             </a:fld>
             <a:endParaRPr lang="en-US" dirty="0"/>
           </a:p>
@@ -414,7 +414,7 @@
           <a:p>
             <a:fld id="{7E7B7340-DDD5-1B49-81AA-25BC4050C073}" type="datetimeFigureOut">
               <a:rPr lang="en-US" smtClean="0"/>
-              <a:t>8/6/17</a:t>
+              <a:t>10/3/17</a:t>
             </a:fld>
             <a:endParaRPr lang="en-US" dirty="0"/>
           </a:p>
@@ -8062,7 +8062,27 @@
             </a:pPr>
             <a:r>
               <a:rPr lang="en-US" sz="1400" dirty="0" smtClean="0"/>
-              <a:t>Add the Spring Data JPA starter to our pom.xml file</a:t>
+              <a:t>Add the </a:t>
+            </a:r>
+            <a:r>
+              <a:rPr lang="en-US" sz="1400" b="1" dirty="0" smtClean="0"/>
+              <a:t>Spring Data JPA starter</a:t>
+            </a:r>
+            <a:r>
+              <a:rPr lang="en-US" sz="1400" dirty="0" smtClean="0"/>
+              <a:t> to our </a:t>
+            </a:r>
+            <a:r>
+              <a:rPr lang="en-US" sz="1400" b="1" dirty="0" err="1" smtClean="0"/>
+              <a:t>build.gradle</a:t>
+            </a:r>
+            <a:r>
+              <a:rPr lang="en-US" sz="1400" dirty="0" smtClean="0"/>
+              <a:t> </a:t>
+            </a:r>
+            <a:r>
+              <a:rPr lang="en-US" sz="1400" dirty="0" smtClean="0"/>
+              <a:t>file</a:t>
             </a:r>
           </a:p>
         </p:txBody>
@@ -8253,7 +8273,7 @@
         </p:spPr>
         <p:txBody>
           <a:bodyPr>
-            <a:normAutofit/>
+            <a:normAutofit fontScale="92500"/>
           </a:bodyPr>
           <a:lstStyle>
             <a:lvl1pPr marL="342900" indent="-342900" algn="l" defTabSz="457200" rtl="0" eaLnBrk="1" latinLnBrk="0" hangingPunct="1">
@@ -8399,59 +8419,28 @@
             </a:pPr>
             <a:r>
               <a:rPr lang="en-US" sz="1400" dirty="0" smtClean="0"/>
-              <a:t>Sprinkle a database connector into our pom.xml</a:t>
+              <a:t>Sprinkle a </a:t>
             </a:r>
+            <a:r>
+              <a:rPr lang="en-US" sz="1400" b="1" dirty="0" smtClean="0"/>
+              <a:t>database connector </a:t>
+            </a:r>
+            <a:r>
+              <a:rPr lang="en-US" sz="1400" dirty="0" smtClean="0"/>
+              <a:t>into our </a:t>
+            </a:r>
+            <a:r>
+              <a:rPr lang="en-US" sz="1400" b="1" dirty="0" err="1" smtClean="0"/>
+              <a:t>build.gradle</a:t>
+            </a:r>
+            <a:r>
+              <a:rPr lang="en-US" sz="1400" dirty="0" smtClean="0"/>
+              <a:t> file</a:t>
+            </a:r>
+            <a:endParaRPr lang="en-US" sz="1400" dirty="0" smtClean="0"/>
           </a:p>
         </p:txBody>
       </p:sp>
-      <p:pic>
-        <p:nvPicPr>
-          <p:cNvPr id="8" name="Picture 7"/>
-          <p:cNvPicPr>
-            <a:picLocks noChangeAspect="1"/>
-          </p:cNvPicPr>
-          <p:nvPr/>
-        </p:nvPicPr>
-        <p:blipFill>
-          <a:blip r:embed="rId3"/>
-          <a:stretch>
-            <a:fillRect/>
-          </a:stretch>
-        </p:blipFill>
-        <p:spPr>
-          <a:xfrm>
-            <a:off x="3340100" y="2256155"/>
-            <a:ext cx="3886200" cy="1117600"/>
-          </a:xfrm>
-          <a:prstGeom prst="rect">
-            <a:avLst/>
-          </a:prstGeom>
-        </p:spPr>
-      </p:pic>
-      <p:pic>
-        <p:nvPicPr>
-          <p:cNvPr id="9" name="Picture 8"/>
-          <p:cNvPicPr>
-            <a:picLocks noChangeAspect="1"/>
-          </p:cNvPicPr>
-          <p:nvPr/>
-        </p:nvPicPr>
-        <p:blipFill>
-          <a:blip r:embed="rId4"/>
-          <a:stretch>
-            <a:fillRect/>
-          </a:stretch>
-        </p:blipFill>
-        <p:spPr>
-          <a:xfrm>
-            <a:off x="3340100" y="1018540"/>
-            <a:ext cx="5626100" cy="850900"/>
-          </a:xfrm>
-          <a:prstGeom prst="rect">
-            <a:avLst/>
-          </a:prstGeom>
-        </p:spPr>
-      </p:pic>
       <p:pic>
         <p:nvPicPr>
           <p:cNvPr id="10" name="Picture 9"/>
@@ -8461,7 +8450,7 @@
           <p:nvPr/>
         </p:nvPicPr>
         <p:blipFill>
-          <a:blip r:embed="rId5"/>
+          <a:blip r:embed="rId3"/>
           <a:stretch>
             <a:fillRect/>
           </a:stretch>
@@ -8641,7 +8630,15 @@
             </a:pPr>
             <a:r>
               <a:rPr lang="en-US" sz="1400" dirty="0" smtClean="0"/>
-              <a:t>Sprinkle a little @EnableJpaRepositories annotation into our Spring Boot application</a:t>
+              <a:t>Sprinkle a little </a:t>
+            </a:r>
+            <a:r>
+              <a:rPr lang="en-US" sz="1400" b="1" dirty="0" smtClean="0"/>
+              <a:t>@EnableJpaRepositories </a:t>
+            </a:r>
+            <a:r>
+              <a:rPr lang="en-US" sz="1400" dirty="0" smtClean="0"/>
+              <a:t>annotation into our Spring Boot application</a:t>
             </a:r>
           </a:p>
         </p:txBody>
@@ -8655,7 +8652,7 @@
           <p:nvPr/>
         </p:nvPicPr>
         <p:blipFill>
-          <a:blip r:embed="rId6"/>
+          <a:blip r:embed="rId4"/>
           <a:stretch>
             <a:fillRect/>
           </a:stretch>
@@ -8664,6 +8661,66 @@
           <a:xfrm>
             <a:off x="3042920" y="3677920"/>
             <a:ext cx="2625753" cy="619125"/>
+          </a:xfrm>
+          <a:prstGeom prst="rect">
+            <a:avLst/>
+          </a:prstGeom>
+        </p:spPr>
+      </p:pic>
+      <p:pic>
+        <p:nvPicPr>
+          <p:cNvPr id="4" name="Picture 3"/>
+          <p:cNvPicPr>
+            <a:picLocks noChangeAspect="1"/>
+          </p:cNvPicPr>
+          <p:nvPr/>
+        </p:nvPicPr>
+        <p:blipFill>
+          <a:blip r:embed="rId5">
+            <a:extLst>
+              <a:ext uri="{28A0092B-C50C-407E-A947-70E740481C1C}">
+                <a14:useLocalDpi xmlns:a14="http://schemas.microsoft.com/office/drawing/2010/main" val="0"/>
+              </a:ext>
+            </a:extLst>
+          </a:blip>
+          <a:stretch>
+            <a:fillRect/>
+          </a:stretch>
+        </p:blipFill>
+        <p:spPr>
+          <a:xfrm>
+            <a:off x="3195320" y="1013171"/>
+            <a:ext cx="5491480" cy="766002"/>
+          </a:xfrm>
+          <a:prstGeom prst="rect">
+            <a:avLst/>
+          </a:prstGeom>
+        </p:spPr>
+      </p:pic>
+      <p:pic>
+        <p:nvPicPr>
+          <p:cNvPr id="5" name="Picture 4"/>
+          <p:cNvPicPr>
+            <a:picLocks noChangeAspect="1"/>
+          </p:cNvPicPr>
+          <p:nvPr/>
+        </p:nvPicPr>
+        <p:blipFill>
+          <a:blip r:embed="rId6">
+            <a:extLst>
+              <a:ext uri="{28A0092B-C50C-407E-A947-70E740481C1C}">
+                <a14:useLocalDpi xmlns:a14="http://schemas.microsoft.com/office/drawing/2010/main" val="0"/>
+              </a:ext>
+            </a:extLst>
+          </a:blip>
+          <a:stretch>
+            <a:fillRect/>
+          </a:stretch>
+        </p:blipFill>
+        <p:spPr>
+          <a:xfrm>
+            <a:off x="3195320" y="2195988"/>
+            <a:ext cx="2606040" cy="622495"/>
           </a:xfrm>
           <a:prstGeom prst="rect">
             <a:avLst/>
@@ -9672,30 +9729,6 @@
           </a:p>
         </p:txBody>
       </p:sp>
-      <p:pic>
-        <p:nvPicPr>
-          <p:cNvPr id="5" name="Picture 4"/>
-          <p:cNvPicPr>
-            <a:picLocks noChangeAspect="1"/>
-          </p:cNvPicPr>
-          <p:nvPr/>
-        </p:nvPicPr>
-        <p:blipFill>
-          <a:blip r:embed="rId3"/>
-          <a:stretch>
-            <a:fillRect/>
-          </a:stretch>
-        </p:blipFill>
-        <p:spPr>
-          <a:xfrm>
-            <a:off x="3266440" y="2890520"/>
-            <a:ext cx="5562600" cy="914400"/>
-          </a:xfrm>
-          <a:prstGeom prst="rect">
-            <a:avLst/>
-          </a:prstGeom>
-        </p:spPr>
-      </p:pic>
       <p:sp>
         <p:nvSpPr>
           <p:cNvPr id="8" name="Content Placeholder 2"/>
@@ -9715,7 +9748,7 @@
         </p:spPr>
         <p:txBody>
           <a:bodyPr>
-            <a:normAutofit/>
+            <a:normAutofit fontScale="92500"/>
           </a:bodyPr>
           <a:lstStyle>
             <a:lvl1pPr marL="342900" indent="-342900" algn="l" defTabSz="457200" rtl="0" eaLnBrk="1" latinLnBrk="0" hangingPunct="1">
@@ -9861,11 +9894,50 @@
             </a:pPr>
             <a:r>
               <a:rPr lang="en-US" sz="1400" dirty="0" smtClean="0"/>
-              <a:t>Add a dash of Spring Data REST starter into our pom.xml</a:t>
+              <a:t>Add a dash of Spring Data REST starter into our </a:t>
             </a:r>
+            <a:r>
+              <a:rPr lang="en-US" sz="1400" dirty="0" err="1" smtClean="0"/>
+              <a:t>build.gradle</a:t>
+            </a:r>
+            <a:r>
+              <a:rPr lang="en-US" sz="1400" dirty="0" smtClean="0"/>
+              <a:t> file</a:t>
+            </a:r>
+            <a:endParaRPr lang="en-US" sz="1400" dirty="0" smtClean="0"/>
           </a:p>
         </p:txBody>
       </p:sp>
+      <p:pic>
+        <p:nvPicPr>
+          <p:cNvPr id="3" name="Picture 2"/>
+          <p:cNvPicPr>
+            <a:picLocks noChangeAspect="1"/>
+          </p:cNvPicPr>
+          <p:nvPr/>
+        </p:nvPicPr>
+        <p:blipFill>
+          <a:blip r:embed="rId3">
+            <a:extLst>
+              <a:ext uri="{28A0092B-C50C-407E-A947-70E740481C1C}">
+                <a14:useLocalDpi xmlns:a14="http://schemas.microsoft.com/office/drawing/2010/main" val="0"/>
+              </a:ext>
+            </a:extLst>
+          </a:blip>
+          <a:stretch>
+            <a:fillRect/>
+          </a:stretch>
+        </p:blipFill>
+        <p:spPr>
+          <a:xfrm>
+            <a:off x="3235960" y="2906789"/>
+            <a:ext cx="5593080" cy="811375"/>
+          </a:xfrm>
+          <a:prstGeom prst="rect">
+            <a:avLst/>
+          </a:prstGeom>
+        </p:spPr>
+      </p:pic>
     </p:spTree>
     <p:extLst>
       <p:ext uri="{BB962C8B-B14F-4D97-AF65-F5344CB8AC3E}">
@@ -11034,7 +11106,7 @@
         </p:spPr>
         <p:txBody>
           <a:bodyPr>
-            <a:normAutofit/>
+            <a:normAutofit lnSpcReduction="10000"/>
           </a:bodyPr>
           <a:lstStyle/>
           <a:p>

</xml_diff>

<commit_message>
Updated presentations, solutions codebase and labs instructions * Update build.gradle references of compile to implementation * Update screenshots in presentations * Regenerate lab guide (PDF format) * Update service discovery examples per suggestions from Aaron Wood * Other content updates
</commit_message>
<xml_diff>
--- a/presentations/102 - Intro to Spring Boot/Session_3_Polyglot_Persist.pptx
+++ b/presentations/102 - Intro to Spring Boot/Session_3_Polyglot_Persist.pptx
@@ -16,8 +16,8 @@
     <p:sldId id="353" r:id="rId4"/>
     <p:sldId id="355" r:id="rId5"/>
     <p:sldId id="357" r:id="rId6"/>
-    <p:sldId id="358" r:id="rId7"/>
-    <p:sldId id="356" r:id="rId8"/>
+    <p:sldId id="356" r:id="rId7"/>
+    <p:sldId id="358" r:id="rId8"/>
     <p:sldId id="359" r:id="rId9"/>
     <p:sldId id="360" r:id="rId10"/>
     <p:sldId id="361" r:id="rId11"/>
@@ -133,8 +133,8 @@
             <p14:sldId id="353"/>
             <p14:sldId id="355"/>
             <p14:sldId id="357"/>
+            <p14:sldId id="356"/>
             <p14:sldId id="358"/>
-            <p14:sldId id="356"/>
             <p14:sldId id="359"/>
             <p14:sldId id="360"/>
             <p14:sldId id="361"/>
@@ -248,7 +248,7 @@
           <a:p>
             <a:fld id="{372E5B6B-8713-8747-AE5B-F1241B2BF5F0}" type="datetimeFigureOut">
               <a:rPr lang="en-US" smtClean="0"/>
-              <a:t>10/12/17</a:t>
+              <a:t>2/15/19</a:t>
             </a:fld>
             <a:endParaRPr lang="en-US" dirty="0"/>
           </a:p>
@@ -414,7 +414,7 @@
           <a:p>
             <a:fld id="{7E7B7340-DDD5-1B49-81AA-25BC4050C073}" type="datetimeFigureOut">
               <a:rPr lang="en-US" smtClean="0"/>
-              <a:t>10/12/17</a:t>
+              <a:t>2/15/19</a:t>
             </a:fld>
             <a:endParaRPr lang="en-US" dirty="0"/>
           </a:p>
@@ -478,38 +478,37 @@
           <a:p>
             <a:pPr lvl="0"/>
             <a:r>
-              <a:rPr lang="en-US" smtClean="0"/>
+              <a:rPr lang="en-US"/>
               <a:t>Click to edit Master text styles</a:t>
             </a:r>
           </a:p>
           <a:p>
             <a:pPr lvl="1"/>
             <a:r>
-              <a:rPr lang="en-US" smtClean="0"/>
+              <a:rPr lang="en-US"/>
               <a:t>Second level</a:t>
             </a:r>
           </a:p>
           <a:p>
             <a:pPr lvl="2"/>
             <a:r>
-              <a:rPr lang="en-US" smtClean="0"/>
+              <a:rPr lang="en-US"/>
               <a:t>Third level</a:t>
             </a:r>
           </a:p>
           <a:p>
             <a:pPr lvl="3"/>
             <a:r>
-              <a:rPr lang="en-US" smtClean="0"/>
+              <a:rPr lang="en-US"/>
               <a:t>Fourth level</a:t>
             </a:r>
           </a:p>
           <a:p>
             <a:pPr lvl="4"/>
             <a:r>
-              <a:rPr lang="en-US" smtClean="0"/>
+              <a:rPr lang="en-US"/>
               <a:t>Fifth level</a:t>
             </a:r>
-            <a:endParaRPr lang="en-US"/>
           </a:p>
         </p:txBody>
       </p:sp>
@@ -728,11 +727,11 @@
           <a:lstStyle/>
           <a:p>
             <a:r>
-              <a:rPr lang="en-US" dirty="0" smtClean="0"/>
+              <a:rPr lang="en-US" dirty="0"/>
               <a:t>Resting slide</a:t>
             </a:r>
             <a:r>
-              <a:rPr lang="en-US" baseline="0" dirty="0" smtClean="0"/>
+              <a:rPr lang="en-US" baseline="0" dirty="0"/>
               <a:t> on screen before you begin presenting.</a:t>
             </a:r>
             <a:endParaRPr lang="en-US" dirty="0"/>
@@ -1391,6 +1390,57 @@
           <a:bodyPr/>
           <a:lstStyle/>
           <a:p>
+            <a:pPr marL="171450" indent="-171450">
+              <a:buFont typeface="Arial"/>
+              <a:buChar char="•"/>
+            </a:pPr>
+            <a:r>
+              <a:rPr lang="en-US" sz="1200" dirty="0"/>
+              <a:t>Provide radically faster and widely accessible “getting started” experience for all Spring development</a:t>
+            </a:r>
+          </a:p>
+          <a:p>
+            <a:pPr marL="171450" indent="-171450">
+              <a:buFont typeface="Arial"/>
+              <a:buChar char="•"/>
+            </a:pPr>
+            <a:r>
+              <a:rPr lang="en-US" sz="1200" dirty="0">
+                <a:solidFill>
+                  <a:srgbClr val="FFFFFF"/>
+                </a:solidFill>
+              </a:rPr>
+              <a:t>Opinionated out of the box, but get out of the way as quickly as possible</a:t>
+            </a:r>
+          </a:p>
+          <a:p>
+            <a:pPr marL="171450" indent="-171450">
+              <a:buFont typeface="Arial"/>
+              <a:buChar char="•"/>
+            </a:pPr>
+            <a:r>
+              <a:rPr lang="en-US" sz="1200" dirty="0">
+                <a:solidFill>
+                  <a:srgbClr val="FFFFFF"/>
+                </a:solidFill>
+              </a:rPr>
+              <a:t>Provide a range of non-functional</a:t>
+            </a:r>
+            <a:r>
+              <a:rPr lang="en-US" sz="1200" baseline="0" dirty="0">
+                <a:solidFill>
+                  <a:srgbClr val="FFFFFF"/>
+                </a:solidFill>
+              </a:rPr>
+              <a:t> features (embedded servers, metrics, health checks, externalized config)</a:t>
+            </a:r>
+            <a:endParaRPr lang="en-US" sz="1200" dirty="0">
+              <a:solidFill>
+                <a:srgbClr val="FFFFFF"/>
+              </a:solidFill>
+            </a:endParaRPr>
+          </a:p>
+          <a:p>
             <a:endParaRPr lang="en-US" dirty="0"/>
           </a:p>
         </p:txBody>
@@ -1475,57 +1525,6 @@
           <a:bodyPr/>
           <a:lstStyle/>
           <a:p>
-            <a:pPr marL="171450" indent="-171450">
-              <a:buFont typeface="Arial"/>
-              <a:buChar char="•"/>
-            </a:pPr>
-            <a:r>
-              <a:rPr lang="en-US" sz="1200" dirty="0" smtClean="0"/>
-              <a:t>Provide radically faster and widely accessible “getting started” experience for all Spring development</a:t>
-            </a:r>
-          </a:p>
-          <a:p>
-            <a:pPr marL="171450" indent="-171450">
-              <a:buFont typeface="Arial"/>
-              <a:buChar char="•"/>
-            </a:pPr>
-            <a:r>
-              <a:rPr lang="en-US" sz="1200" dirty="0" smtClean="0">
-                <a:solidFill>
-                  <a:srgbClr val="FFFFFF"/>
-                </a:solidFill>
-              </a:rPr>
-              <a:t>Opinionated out of the box, but get out of the way as quickly as possible</a:t>
-            </a:r>
-          </a:p>
-          <a:p>
-            <a:pPr marL="171450" indent="-171450">
-              <a:buFont typeface="Arial"/>
-              <a:buChar char="•"/>
-            </a:pPr>
-            <a:r>
-              <a:rPr lang="en-US" sz="1200" dirty="0" smtClean="0">
-                <a:solidFill>
-                  <a:srgbClr val="FFFFFF"/>
-                </a:solidFill>
-              </a:rPr>
-              <a:t>Provide a range of non-functional</a:t>
-            </a:r>
-            <a:r>
-              <a:rPr lang="en-US" sz="1200" baseline="0" dirty="0" smtClean="0">
-                <a:solidFill>
-                  <a:srgbClr val="FFFFFF"/>
-                </a:solidFill>
-              </a:rPr>
-              <a:t> features (embedded servers, metrics, health checks, externalized config)</a:t>
-            </a:r>
-            <a:endParaRPr lang="en-US" sz="1200" dirty="0" smtClean="0">
-              <a:solidFill>
-                <a:srgbClr val="FFFFFF"/>
-              </a:solidFill>
-            </a:endParaRPr>
-          </a:p>
-          <a:p>
             <a:endParaRPr lang="en-US" dirty="0"/>
           </a:p>
         </p:txBody>
@@ -1953,10 +1952,9 @@
           </a:lstStyle>
           <a:p>
             <a:r>
-              <a:rPr lang="en-US" dirty="0" smtClean="0"/>
+              <a:rPr lang="en-US" dirty="0"/>
               <a:t>Click to edit Master title style</a:t>
             </a:r>
-            <a:endParaRPr lang="en-US" dirty="0"/>
           </a:p>
         </p:txBody>
       </p:sp>
@@ -2019,10 +2017,9 @@
           <a:p>
             <a:pPr lvl="0"/>
             <a:r>
-              <a:rPr lang="en-US" dirty="0" smtClean="0"/>
+              <a:rPr lang="en-US" dirty="0"/>
               <a:t>Click to edit Master</a:t>
             </a:r>
-            <a:endParaRPr lang="en-US" dirty="0"/>
           </a:p>
         </p:txBody>
       </p:sp>
@@ -2036,13 +2033,6 @@
   <p:clrMapOvr>
     <a:masterClrMapping/>
   </p:clrMapOvr>
-  <p:timing>
-    <p:tnLst>
-      <p:par>
-        <p:cTn id="1" dur="indefinite" restart="never" nodeType="tmRoot"/>
-      </p:par>
-    </p:tnLst>
-  </p:timing>
 </p:sldLayout>
 </file>
 
@@ -2334,10 +2324,9 @@
           </a:lstStyle>
           <a:p>
             <a:r>
-              <a:rPr lang="en-US" dirty="0" smtClean="0"/>
+              <a:rPr lang="en-US" dirty="0"/>
               <a:t>CLICK TO EDIT MASTER TITLE STYLE</a:t>
             </a:r>
-            <a:endParaRPr lang="en-US" dirty="0"/>
           </a:p>
         </p:txBody>
       </p:sp>
@@ -2412,35 +2401,35 @@
           <a:p>
             <a:pPr lvl="0"/>
             <a:r>
-              <a:rPr lang="en-US" smtClean="0"/>
+              <a:rPr lang="en-US"/>
               <a:t>Click to edit Master text styles</a:t>
             </a:r>
           </a:p>
           <a:p>
             <a:pPr lvl="1"/>
             <a:r>
-              <a:rPr lang="en-US" smtClean="0"/>
+              <a:rPr lang="en-US"/>
               <a:t>Second level</a:t>
             </a:r>
           </a:p>
           <a:p>
             <a:pPr lvl="2"/>
             <a:r>
-              <a:rPr lang="en-US" smtClean="0"/>
+              <a:rPr lang="en-US"/>
               <a:t>Third level</a:t>
             </a:r>
           </a:p>
           <a:p>
             <a:pPr lvl="3"/>
             <a:r>
-              <a:rPr lang="en-US" smtClean="0"/>
+              <a:rPr lang="en-US"/>
               <a:t>Fourth level</a:t>
             </a:r>
           </a:p>
           <a:p>
             <a:pPr lvl="4"/>
             <a:r>
-              <a:rPr lang="en-US" smtClean="0"/>
+              <a:rPr lang="en-US"/>
               <a:t>Fifth level</a:t>
             </a:r>
             <a:endParaRPr lang="en-US" dirty="0"/>
@@ -2519,7 +2508,7 @@
           <a:p>
             <a:pPr algn="l"/>
             <a:r>
-              <a:rPr lang="en-US" sz="600" dirty="0" smtClean="0">
+              <a:rPr lang="en-US" sz="600" dirty="0">
                 <a:solidFill>
                   <a:schemeClr val="bg1">
                     <a:lumMod val="50000"/>
@@ -2531,7 +2520,7 @@
               <a:t>© Copyright 2015 Pivotal.</a:t>
             </a:r>
             <a:r>
-              <a:rPr lang="en-US" sz="600" baseline="0" dirty="0" smtClean="0">
+              <a:rPr lang="en-US" sz="600" baseline="0" dirty="0">
                 <a:solidFill>
                   <a:schemeClr val="bg1">
                     <a:lumMod val="50000"/>
@@ -2543,7 +2532,7 @@
               <a:t> </a:t>
             </a:r>
             <a:r>
-              <a:rPr lang="en-US" sz="600" dirty="0" smtClean="0">
+              <a:rPr lang="en-US" sz="600" dirty="0">
                 <a:solidFill>
                   <a:schemeClr val="bg1">
                     <a:lumMod val="50000"/>
@@ -2554,15 +2543,6 @@
               </a:rPr>
               <a:t>All rights reserved.</a:t>
             </a:r>
-            <a:endParaRPr lang="en-US" sz="600" dirty="0">
-              <a:solidFill>
-                <a:schemeClr val="bg1">
-                  <a:lumMod val="50000"/>
-                </a:schemeClr>
-              </a:solidFill>
-              <a:latin typeface="Arial"/>
-              <a:cs typeface="Arial"/>
-            </a:endParaRPr>
           </a:p>
         </p:txBody>
       </p:sp>
@@ -2635,13 +2615,6 @@
   <p:clrMapOvr>
     <a:masterClrMapping/>
   </p:clrMapOvr>
-  <p:timing>
-    <p:tnLst>
-      <p:par>
-        <p:cTn id="1" dur="indefinite" restart="never" nodeType="tmRoot"/>
-      </p:par>
-    </p:tnLst>
-  </p:timing>
 </p:sldLayout>
 </file>
 
@@ -2696,10 +2669,9 @@
           </a:lstStyle>
           <a:p>
             <a:r>
-              <a:rPr lang="en-US" dirty="0" smtClean="0"/>
+              <a:rPr lang="en-US" dirty="0"/>
               <a:t>Click to edit Master title style</a:t>
             </a:r>
-            <a:endParaRPr lang="en-US" dirty="0"/>
           </a:p>
         </p:txBody>
       </p:sp>
@@ -2795,10 +2767,9 @@
           <a:p>
             <a:pPr lvl="0"/>
             <a:r>
-              <a:rPr lang="en-US" dirty="0" smtClean="0"/>
+              <a:rPr lang="en-US" dirty="0"/>
               <a:t>Click to edit Master</a:t>
             </a:r>
-            <a:endParaRPr lang="en-US" dirty="0"/>
           </a:p>
         </p:txBody>
       </p:sp>
@@ -2862,13 +2833,6 @@
   <p:clrMapOvr>
     <a:masterClrMapping/>
   </p:clrMapOvr>
-  <p:timing>
-    <p:tnLst>
-      <p:par>
-        <p:cTn id="1" dur="indefinite" restart="never" nodeType="tmRoot"/>
-      </p:par>
-    </p:tnLst>
-  </p:timing>
 </p:sldLayout>
 </file>
 
@@ -3040,13 +3004,6 @@
   <p:clrMapOvr>
     <a:masterClrMapping/>
   </p:clrMapOvr>
-  <p:timing>
-    <p:tnLst>
-      <p:par>
-        <p:cTn id="1" dur="indefinite" restart="never" nodeType="tmRoot"/>
-      </p:par>
-    </p:tnLst>
-  </p:timing>
 </p:sldLayout>
 </file>
 
@@ -3133,13 +3090,6 @@
   <p:clrMapOvr>
     <a:masterClrMapping/>
   </p:clrMapOvr>
-  <p:timing>
-    <p:tnLst>
-      <p:par>
-        <p:cTn id="1" dur="indefinite" restart="never" nodeType="tmRoot"/>
-      </p:par>
-    </p:tnLst>
-  </p:timing>
 </p:sldLayout>
 </file>
 
@@ -3198,10 +3148,9 @@
           </a:lstStyle>
           <a:p>
             <a:r>
-              <a:rPr lang="en-US" dirty="0" smtClean="0"/>
+              <a:rPr lang="en-US" dirty="0"/>
               <a:t>Click to Edit Master Title Style</a:t>
             </a:r>
-            <a:endParaRPr lang="en-US" dirty="0"/>
           </a:p>
         </p:txBody>
       </p:sp>
@@ -3218,13 +3167,6 @@
   <p:transition>
     <p:fade/>
   </p:transition>
-  <p:timing>
-    <p:tnLst>
-      <p:par>
-        <p:cTn id="1" dur="indefinite" restart="never" nodeType="tmRoot"/>
-      </p:par>
-    </p:tnLst>
-  </p:timing>
 </p:sldLayout>
 </file>
 
@@ -3593,13 +3535,6 @@
   <p:clrMapOvr>
     <a:masterClrMapping/>
   </p:clrMapOvr>
-  <p:timing>
-    <p:tnLst>
-      <p:par>
-        <p:cTn id="1" dur="indefinite" restart="never" nodeType="tmRoot"/>
-      </p:par>
-    </p:tnLst>
-  </p:timing>
 </p:sldLayout>
 </file>
 
@@ -3654,10 +3589,9 @@
           </a:lstStyle>
           <a:p>
             <a:r>
-              <a:rPr lang="en-US" dirty="0" smtClean="0"/>
+              <a:rPr lang="en-US" dirty="0"/>
               <a:t>Click to edit Master title style</a:t>
             </a:r>
-            <a:endParaRPr lang="en-US" dirty="0"/>
           </a:p>
         </p:txBody>
       </p:sp>
@@ -3694,13 +3628,6 @@
   <p:clrMapOvr>
     <a:masterClrMapping/>
   </p:clrMapOvr>
-  <p:timing>
-    <p:tnLst>
-      <p:par>
-        <p:cTn id="1" dur="indefinite" restart="never" nodeType="tmRoot"/>
-      </p:par>
-    </p:tnLst>
-  </p:timing>
 </p:sldLayout>
 </file>
 
@@ -4056,10 +3983,9 @@
           </a:lstStyle>
           <a:p>
             <a:r>
-              <a:rPr lang="en-US" dirty="0" smtClean="0"/>
+              <a:rPr lang="en-US" dirty="0"/>
               <a:t>Click to edit Master title style</a:t>
             </a:r>
-            <a:endParaRPr lang="en-US" dirty="0"/>
           </a:p>
         </p:txBody>
       </p:sp>
@@ -4155,10 +4081,9 @@
           <a:p>
             <a:pPr lvl="0"/>
             <a:r>
-              <a:rPr lang="en-US" dirty="0" smtClean="0"/>
+              <a:rPr lang="en-US" dirty="0"/>
               <a:t>Click to edit Master</a:t>
             </a:r>
-            <a:endParaRPr lang="en-US" dirty="0"/>
           </a:p>
         </p:txBody>
       </p:sp>
@@ -4172,13 +4097,6 @@
   <p:clrMapOvr>
     <a:masterClrMapping/>
   </p:clrMapOvr>
-  <p:timing>
-    <p:tnLst>
-      <p:par>
-        <p:cTn id="1" dur="indefinite" restart="never" nodeType="tmRoot"/>
-      </p:par>
-    </p:tnLst>
-  </p:timing>
 </p:sldLayout>
 </file>
 
@@ -4350,13 +4268,6 @@
   <p:clrMapOvr>
     <a:masterClrMapping/>
   </p:clrMapOvr>
-  <p:timing>
-    <p:tnLst>
-      <p:par>
-        <p:cTn id="1" dur="indefinite" restart="never" nodeType="tmRoot"/>
-      </p:par>
-    </p:tnLst>
-  </p:timing>
 </p:sldLayout>
 </file>
 
@@ -4443,13 +4354,6 @@
   <p:clrMapOvr>
     <a:masterClrMapping/>
   </p:clrMapOvr>
-  <p:timing>
-    <p:tnLst>
-      <p:par>
-        <p:cTn id="1" dur="indefinite" restart="never" nodeType="tmRoot"/>
-      </p:par>
-    </p:tnLst>
-  </p:timing>
 </p:sldLayout>
 </file>
 
@@ -4508,10 +4412,9 @@
           </a:lstStyle>
           <a:p>
             <a:r>
-              <a:rPr lang="en-US" dirty="0" smtClean="0"/>
+              <a:rPr lang="en-US" dirty="0"/>
               <a:t>Click to Edit Master Title Style</a:t>
             </a:r>
-            <a:endParaRPr lang="en-US" dirty="0"/>
           </a:p>
         </p:txBody>
       </p:sp>
@@ -4528,13 +4431,6 @@
   <p:transition>
     <p:fade/>
   </p:transition>
-  <p:timing>
-    <p:tnLst>
-      <p:par>
-        <p:cTn id="1" dur="indefinite" restart="never" nodeType="tmRoot"/>
-      </p:par>
-    </p:tnLst>
-  </p:timing>
 </p:sldLayout>
 </file>
 
@@ -4737,13 +4633,6 @@
     <p:sldLayoutId id="2147483733" r:id="rId3"/>
     <p:sldLayoutId id="2147483734" r:id="rId4"/>
   </p:sldLayoutIdLst>
-  <p:timing>
-    <p:tnLst>
-      <p:par>
-        <p:cTn id="1" dur="indefinite" restart="never" nodeType="tmRoot"/>
-      </p:par>
-    </p:tnLst>
-  </p:timing>
   <p:hf hdr="0" ftr="0" dt="0"/>
   <p:txStyles>
     <p:titleStyle>
@@ -5071,13 +4960,6 @@
     <p:sldLayoutId id="2147483723" r:id="rId7"/>
     <p:sldLayoutId id="2147483735" r:id="rId8"/>
   </p:sldLayoutIdLst>
-  <p:timing>
-    <p:tnLst>
-      <p:par>
-        <p:cTn id="1" dur="indefinite" restart="never" nodeType="tmRoot"/>
-      </p:par>
-    </p:tnLst>
-  </p:timing>
   <p:hf hdr="0" ftr="0" dt="0"/>
   <p:txStyles>
     <p:titleStyle>
@@ -5404,13 +5286,6 @@
     <p:sldLayoutId id="2147483730" r:id="rId6"/>
     <p:sldLayoutId id="2147483731" r:id="rId7"/>
   </p:sldLayoutIdLst>
-  <p:timing>
-    <p:tnLst>
-      <p:par>
-        <p:cTn id="1" dur="indefinite" restart="never" nodeType="tmRoot"/>
-      </p:par>
-    </p:tnLst>
-  </p:timing>
   <p:hf hdr="0" ftr="0" dt="0"/>
   <p:txStyles>
     <p:titleStyle>
@@ -5823,7 +5698,7 @@
               </a:spcAft>
             </a:pPr>
             <a:r>
-              <a:rPr lang="en-US" sz="4200" b="1" spc="-100" dirty="0" smtClean="0">
+              <a:rPr lang="en-US" sz="4200" b="1" spc="-100" dirty="0">
                 <a:solidFill>
                   <a:srgbClr val="00AE9E"/>
                 </a:solidFill>
@@ -5880,7 +5755,7 @@
               </a:spcAft>
             </a:pPr>
             <a:r>
-              <a:rPr lang="en-US" sz="2800" spc="-100" dirty="0" smtClean="0">
+              <a:rPr lang="en-US" sz="2800" spc="-100" dirty="0">
                 <a:solidFill>
                   <a:schemeClr val="bg1"/>
                 </a:solidFill>
@@ -5895,19 +5770,6 @@
               </a:rPr>
               <a:t>Polyglot Persistence with Spring Data REST</a:t>
             </a:r>
-            <a:endParaRPr lang="en-US" sz="2800" spc="-100" dirty="0">
-              <a:solidFill>
-                <a:schemeClr val="bg1"/>
-              </a:solidFill>
-              <a:effectLst>
-                <a:outerShdw blurRad="50800" dist="38100" dir="5400000" algn="t" rotWithShape="0">
-                  <a:prstClr val="black">
-                    <a:alpha val="40000"/>
-                  </a:prstClr>
-                </a:outerShdw>
-              </a:effectLst>
-              <a:cs typeface="Arial"/>
-            </a:endParaRPr>
           </a:p>
         </p:txBody>
       </p:sp>
@@ -5921,13 +5783,6 @@
   <p:clrMapOvr>
     <a:masterClrMapping/>
   </p:clrMapOvr>
-  <p:timing>
-    <p:tnLst>
-      <p:par>
-        <p:cTn id="1" dur="indefinite" restart="never" nodeType="tmRoot"/>
-      </p:par>
-    </p:tnLst>
-  </p:timing>
 </p:sld>
 </file>
 
@@ -5964,7 +5819,7 @@
           <a:lstStyle/>
           <a:p>
             <a:r>
-              <a:rPr lang="en-US" dirty="0" smtClean="0"/>
+              <a:rPr lang="en-US" dirty="0"/>
               <a:t>Spring Data REST, what happens?</a:t>
             </a:r>
             <a:endParaRPr lang="en-US" dirty="0">
@@ -6138,7 +5993,7 @@
               <a:buFont typeface="Arial"/>
               <a:buNone/>
             </a:pPr>
-            <a:endParaRPr lang="en-US" sz="1400" dirty="0" smtClean="0"/>
+            <a:endParaRPr lang="en-US" sz="1400" dirty="0"/>
           </a:p>
         </p:txBody>
       </p:sp>
@@ -6176,21 +6031,6 @@
   <p:clrMapOvr>
     <a:masterClrMapping/>
   </p:clrMapOvr>
-  <mc:AlternateContent xmlns:mc="http://schemas.openxmlformats.org/markup-compatibility/2006" xmlns:p14="http://schemas.microsoft.com/office/powerpoint/2010/main">
-    <mc:Choice Requires="p14">
-      <p:transition spd="slow" p14:dur="2000"/>
-    </mc:Choice>
-    <mc:Fallback xmlns="">
-      <p:transition xmlns:p14="http://schemas.microsoft.com/office/powerpoint/2010/main" spd="slow"/>
-    </mc:Fallback>
-  </mc:AlternateContent>
-  <p:timing>
-    <p:tnLst>
-      <p:par>
-        <p:cTn id="1" dur="indefinite" restart="never" nodeType="tmRoot"/>
-      </p:par>
-    </p:tnLst>
-  </p:timing>
 </p:sld>
 </file>
 
@@ -6227,7 +6067,7 @@
           <a:lstStyle/>
           <a:p>
             <a:r>
-              <a:rPr lang="en-US" dirty="0" smtClean="0"/>
+              <a:rPr lang="en-US" dirty="0"/>
               <a:t>MongoRepository</a:t>
             </a:r>
             <a:endParaRPr lang="en-US" dirty="0">
@@ -6401,7 +6241,7 @@
               <a:buFont typeface="Arial"/>
               <a:buNone/>
             </a:pPr>
-            <a:endParaRPr lang="en-US" sz="1400" dirty="0" smtClean="0"/>
+            <a:endParaRPr lang="en-US" sz="1400" dirty="0"/>
           </a:p>
         </p:txBody>
       </p:sp>
@@ -6439,21 +6279,6 @@
   <p:clrMapOvr>
     <a:masterClrMapping/>
   </p:clrMapOvr>
-  <mc:AlternateContent xmlns:mc="http://schemas.openxmlformats.org/markup-compatibility/2006" xmlns:p14="http://schemas.microsoft.com/office/powerpoint/2010/main">
-    <mc:Choice Requires="p14">
-      <p:transition spd="slow" p14:dur="2000"/>
-    </mc:Choice>
-    <mc:Fallback xmlns="">
-      <p:transition xmlns:p14="http://schemas.microsoft.com/office/powerpoint/2010/main" spd="slow"/>
-    </mc:Fallback>
-  </mc:AlternateContent>
-  <p:timing>
-    <p:tnLst>
-      <p:par>
-        <p:cTn id="1" dur="indefinite" restart="never" nodeType="tmRoot"/>
-      </p:par>
-    </p:tnLst>
-  </p:timing>
 </p:sld>
 </file>
 
@@ -6490,7 +6315,7 @@
           <a:lstStyle/>
           <a:p>
             <a:r>
-              <a:rPr lang="en-US" dirty="0" smtClean="0"/>
+              <a:rPr lang="en-US" dirty="0"/>
               <a:t>RedisRepository</a:t>
             </a:r>
             <a:endParaRPr lang="en-US" dirty="0">
@@ -6664,7 +6489,7 @@
               <a:buFont typeface="Arial"/>
               <a:buNone/>
             </a:pPr>
-            <a:endParaRPr lang="en-US" sz="1400" dirty="0" smtClean="0"/>
+            <a:endParaRPr lang="en-US" sz="1400" dirty="0"/>
           </a:p>
         </p:txBody>
       </p:sp>
@@ -6702,21 +6527,6 @@
   <p:clrMapOvr>
     <a:masterClrMapping/>
   </p:clrMapOvr>
-  <mc:AlternateContent xmlns:mc="http://schemas.openxmlformats.org/markup-compatibility/2006" xmlns:p14="http://schemas.microsoft.com/office/powerpoint/2010/main">
-    <mc:Choice Requires="p14">
-      <p:transition spd="slow" p14:dur="2000"/>
-    </mc:Choice>
-    <mc:Fallback xmlns="">
-      <p:transition xmlns:p14="http://schemas.microsoft.com/office/powerpoint/2010/main" spd="slow"/>
-    </mc:Fallback>
-  </mc:AlternateContent>
-  <p:timing>
-    <p:tnLst>
-      <p:par>
-        <p:cTn id="1" dur="indefinite" restart="never" nodeType="tmRoot"/>
-      </p:par>
-    </p:tnLst>
-  </p:timing>
 </p:sld>
 </file>
 
@@ -6753,7 +6563,7 @@
           <a:lstStyle/>
           <a:p>
             <a:r>
-              <a:rPr lang="en-US" dirty="0" smtClean="0"/>
+              <a:rPr lang="en-US" dirty="0"/>
               <a:t>Supported Repositories</a:t>
             </a:r>
             <a:endParaRPr lang="en-US" dirty="0">
@@ -6788,43 +6598,43 @@
               <a:buNone/>
             </a:pPr>
             <a:r>
-              <a:rPr lang="en-US" dirty="0" smtClean="0"/>
+              <a:rPr lang="en-US" dirty="0"/>
               <a:t>Spring</a:t>
             </a:r>
           </a:p>
           <a:p>
             <a:r>
-              <a:rPr lang="en-US" sz="2400" dirty="0" smtClean="0"/>
+              <a:rPr lang="en-US" sz="2400" dirty="0"/>
               <a:t>JPA</a:t>
             </a:r>
           </a:p>
           <a:p>
             <a:r>
-              <a:rPr lang="en-US" sz="2400" dirty="0" smtClean="0"/>
+              <a:rPr lang="en-US" sz="2400" dirty="0"/>
               <a:t>MongoDB</a:t>
             </a:r>
           </a:p>
           <a:p>
             <a:r>
-              <a:rPr lang="en-US" sz="2400" dirty="0" smtClean="0"/>
+              <a:rPr lang="en-US" sz="2400" dirty="0"/>
               <a:t>Redis</a:t>
             </a:r>
           </a:p>
           <a:p>
             <a:r>
-              <a:rPr lang="en-US" sz="2400" dirty="0" smtClean="0"/>
+              <a:rPr lang="en-US" sz="2400" dirty="0"/>
               <a:t>Solr</a:t>
             </a:r>
           </a:p>
           <a:p>
             <a:r>
-              <a:rPr lang="en-US" sz="2400" dirty="0" smtClean="0"/>
+              <a:rPr lang="en-US" sz="2400" dirty="0"/>
               <a:t>GemFire</a:t>
             </a:r>
           </a:p>
           <a:p>
             <a:r>
-              <a:rPr lang="en-US" sz="2400" dirty="0" smtClean="0"/>
+              <a:rPr lang="en-US" sz="2400" dirty="0"/>
               <a:t>KeyValue</a:t>
             </a:r>
           </a:p>
@@ -6996,7 +6806,7 @@
               <a:buFont typeface="Arial"/>
               <a:buNone/>
             </a:pPr>
-            <a:endParaRPr lang="en-US" sz="1400" dirty="0" smtClean="0"/>
+            <a:endParaRPr lang="en-US" sz="1400" dirty="0"/>
           </a:p>
         </p:txBody>
       </p:sp>
@@ -7162,43 +6972,43 @@
               <a:buNone/>
             </a:pPr>
             <a:r>
-              <a:rPr lang="en-US" dirty="0" smtClean="0"/>
+              <a:rPr lang="en-US" dirty="0"/>
               <a:t>Community</a:t>
             </a:r>
           </a:p>
           <a:p>
             <a:r>
-              <a:rPr lang="en-US" sz="2400" dirty="0" smtClean="0"/>
+              <a:rPr lang="en-US" sz="2400" dirty="0"/>
               <a:t>Aerospike</a:t>
             </a:r>
           </a:p>
           <a:p>
             <a:r>
-              <a:rPr lang="en-US" sz="2400" dirty="0" smtClean="0"/>
+              <a:rPr lang="en-US" sz="2400" dirty="0"/>
               <a:t>Cassandra</a:t>
             </a:r>
           </a:p>
           <a:p>
             <a:r>
-              <a:rPr lang="en-US" sz="2400" dirty="0" smtClean="0"/>
+              <a:rPr lang="en-US" sz="2400" dirty="0"/>
               <a:t>Couchbase</a:t>
             </a:r>
           </a:p>
           <a:p>
             <a:r>
-              <a:rPr lang="en-US" sz="2400" dirty="0" smtClean="0"/>
+              <a:rPr lang="en-US" sz="2400" dirty="0"/>
               <a:t>DynamoDB</a:t>
             </a:r>
           </a:p>
           <a:p>
             <a:r>
-              <a:rPr lang="en-US" sz="2400" dirty="0" smtClean="0"/>
+              <a:rPr lang="en-US" sz="2400" dirty="0"/>
               <a:t>ElasticSearch</a:t>
             </a:r>
           </a:p>
           <a:p>
             <a:r>
-              <a:rPr lang="en-US" sz="2400" dirty="0" smtClean="0"/>
+              <a:rPr lang="en-US" sz="2400" dirty="0"/>
               <a:t>Neo4J</a:t>
             </a:r>
           </a:p>
@@ -7217,21 +7027,6 @@
   <p:clrMapOvr>
     <a:masterClrMapping/>
   </p:clrMapOvr>
-  <mc:AlternateContent xmlns:mc="http://schemas.openxmlformats.org/markup-compatibility/2006" xmlns:p14="http://schemas.microsoft.com/office/powerpoint/2010/main">
-    <mc:Choice Requires="p14">
-      <p:transition spd="slow" p14:dur="2000"/>
-    </mc:Choice>
-    <mc:Fallback xmlns="">
-      <p:transition xmlns:p14="http://schemas.microsoft.com/office/powerpoint/2010/main" spd="slow"/>
-    </mc:Fallback>
-  </mc:AlternateContent>
-  <p:timing>
-    <p:tnLst>
-      <p:par>
-        <p:cTn id="1" dur="indefinite" restart="never" nodeType="tmRoot"/>
-      </p:par>
-    </p:tnLst>
-  </p:timing>
 </p:sld>
 </file>
 
@@ -7580,7 +7375,7 @@
               <a:buSzPct val="25000"/>
             </a:pPr>
             <a:r>
-              <a:rPr lang="en-US" cap="all" dirty="0" smtClean="0">
+              <a:rPr lang="en-US" cap="all" dirty="0">
                 <a:solidFill>
                   <a:srgbClr val="74CEC7"/>
                 </a:solidFill>
@@ -7605,21 +7400,6 @@
   <p:clrMapOvr>
     <a:masterClrMapping/>
   </p:clrMapOvr>
-  <mc:AlternateContent xmlns:mc="http://schemas.openxmlformats.org/markup-compatibility/2006" xmlns:p14="http://schemas.microsoft.com/office/powerpoint/2010/main">
-    <mc:Choice Requires="p14">
-      <p:transition p14:dur="0"/>
-    </mc:Choice>
-    <mc:Fallback xmlns="">
-      <p:transition xmlns:p14="http://schemas.microsoft.com/office/powerpoint/2010/main"/>
-    </mc:Fallback>
-  </mc:AlternateContent>
-  <p:timing>
-    <p:tnLst>
-      <p:par>
-        <p:cTn id="1" dur="indefinite" restart="never" nodeType="tmRoot"/>
-      </p:par>
-    </p:tnLst>
-  </p:timing>
 </p:sld>
 </file>
 
@@ -7656,7 +7436,7 @@
           <a:lstStyle/>
           <a:p>
             <a:r>
-              <a:rPr lang="en-US" dirty="0" smtClean="0"/>
+              <a:rPr lang="en-US" dirty="0"/>
               <a:t>Spring Data</a:t>
             </a:r>
             <a:endParaRPr lang="en-US" dirty="0">
@@ -7710,17 +7490,8 @@
             </a:r>
             <a:r>
               <a:rPr lang="en-US" sz="1400" dirty="0"/>
-              <a:t>, Spring-based programming model for data access while still retaining the special traits of </a:t>
+              <a:t>, Spring-based programming model for data access while still retaining the special traits of the underlying data store. </a:t>
             </a:r>
-            <a:r>
-              <a:rPr lang="en-US" sz="1400" dirty="0" smtClean="0"/>
-              <a:t>the </a:t>
-            </a:r>
-            <a:r>
-              <a:rPr lang="en-US" sz="1400" dirty="0"/>
-              <a:t>underlying data store. </a:t>
-            </a:r>
-            <a:endParaRPr lang="en-US" sz="1400" dirty="0" smtClean="0"/>
           </a:p>
           <a:p>
             <a:pPr marL="0" indent="0">
@@ -7744,7 +7515,6 @@
               <a:rPr lang="en-US" sz="1400" dirty="0"/>
               <a:t>data access technologies, relational and non-relational databases, map-reduce frameworks, and cloud-based data services.</a:t>
             </a:r>
-            <a:endParaRPr lang="en-US" sz="1400" dirty="0" smtClean="0"/>
           </a:p>
         </p:txBody>
       </p:sp>
@@ -7911,7 +7681,7 @@
               <a:buFont typeface="Arial"/>
               <a:buNone/>
             </a:pPr>
-            <a:endParaRPr lang="en-US" sz="1400" dirty="0" smtClean="0"/>
+            <a:endParaRPr lang="en-US" sz="1400" dirty="0"/>
           </a:p>
         </p:txBody>
       </p:sp>
@@ -7949,21 +7719,6 @@
   <p:clrMapOvr>
     <a:masterClrMapping/>
   </p:clrMapOvr>
-  <mc:AlternateContent xmlns:mc="http://schemas.openxmlformats.org/markup-compatibility/2006" xmlns:p14="http://schemas.microsoft.com/office/powerpoint/2010/main">
-    <mc:Choice Requires="p14">
-      <p:transition spd="slow" p14:dur="2000"/>
-    </mc:Choice>
-    <mc:Fallback xmlns="">
-      <p:transition xmlns:p14="http://schemas.microsoft.com/office/powerpoint/2010/main" spd="slow"/>
-    </mc:Fallback>
-  </mc:AlternateContent>
-  <p:timing>
-    <p:tnLst>
-      <p:par>
-        <p:cTn id="1" dur="indefinite" restart="never" nodeType="tmRoot"/>
-      </p:par>
-    </p:tnLst>
-  </p:timing>
 </p:sld>
 </file>
 
@@ -8000,7 +7755,7 @@
           <a:lstStyle/>
           <a:p>
             <a:r>
-              <a:rPr lang="en-US" dirty="0" smtClean="0"/>
+              <a:rPr lang="en-US" dirty="0"/>
               <a:t>Spring Data JPA</a:t>
             </a:r>
             <a:endParaRPr lang="en-US" dirty="0">
@@ -8037,23 +7792,23 @@
               <a:buNone/>
             </a:pPr>
             <a:r>
-              <a:rPr lang="en-US" sz="1400" dirty="0" smtClean="0"/>
+              <a:rPr lang="en-US" sz="1400" dirty="0"/>
               <a:t>Add the </a:t>
             </a:r>
             <a:r>
-              <a:rPr lang="en-US" sz="1400" b="1" dirty="0" smtClean="0"/>
+              <a:rPr lang="en-US" sz="1400" b="1" dirty="0"/>
               <a:t>Spring Data JPA starter</a:t>
             </a:r>
             <a:r>
-              <a:rPr lang="en-US" sz="1400" dirty="0" smtClean="0"/>
+              <a:rPr lang="en-US" sz="1400" dirty="0"/>
               <a:t> to our </a:t>
             </a:r>
             <a:r>
-              <a:rPr lang="en-US" sz="1400" b="1" dirty="0" err="1" smtClean="0"/>
+              <a:rPr lang="en-US" sz="1400" b="1" dirty="0" err="1"/>
               <a:t>build.gradle</a:t>
             </a:r>
             <a:r>
-              <a:rPr lang="en-US" sz="1400" dirty="0" smtClean="0"/>
+              <a:rPr lang="en-US" sz="1400" dirty="0"/>
               <a:t> file</a:t>
             </a:r>
           </a:p>
@@ -8222,7 +7977,7 @@
               <a:buFont typeface="Arial"/>
               <a:buNone/>
             </a:pPr>
-            <a:endParaRPr lang="en-US" sz="1400" dirty="0" smtClean="0"/>
+            <a:endParaRPr lang="en-US" sz="1400" dirty="0"/>
           </a:p>
         </p:txBody>
       </p:sp>
@@ -8390,31 +8145,223 @@
               <a:buNone/>
             </a:pPr>
             <a:r>
-              <a:rPr lang="en-US" sz="1400" dirty="0" smtClean="0"/>
+              <a:rPr lang="en-US" sz="1400" dirty="0"/>
               <a:t>Sprinkle a </a:t>
             </a:r>
             <a:r>
-              <a:rPr lang="en-US" sz="1400" b="1" dirty="0" smtClean="0"/>
+              <a:rPr lang="en-US" sz="1400" b="1" dirty="0"/>
               <a:t>database connector </a:t>
             </a:r>
             <a:r>
-              <a:rPr lang="en-US" sz="1400" dirty="0" smtClean="0"/>
+              <a:rPr lang="en-US" sz="1400" dirty="0"/>
               <a:t>into our </a:t>
             </a:r>
             <a:r>
-              <a:rPr lang="en-US" sz="1400" b="1" dirty="0" err="1" smtClean="0"/>
+              <a:rPr lang="en-US" sz="1400" b="1" dirty="0" err="1"/>
               <a:t>build.gradle</a:t>
             </a:r>
             <a:r>
-              <a:rPr lang="en-US" sz="1400" dirty="0" smtClean="0"/>
+              <a:rPr lang="en-US" sz="1400" dirty="0"/>
               <a:t> file</a:t>
             </a:r>
           </a:p>
         </p:txBody>
       </p:sp>
+      <p:sp>
+        <p:nvSpPr>
+          <p:cNvPr id="11" name="Content Placeholder 2"/>
+          <p:cNvSpPr txBox="1">
+            <a:spLocks/>
+          </p:cNvSpPr>
+          <p:nvPr/>
+        </p:nvSpPr>
+        <p:spPr>
+          <a:xfrm>
+            <a:off x="2385892" y="3018580"/>
+            <a:ext cx="3968804" cy="934084"/>
+          </a:xfrm>
+          <a:prstGeom prst="rect">
+            <a:avLst/>
+          </a:prstGeom>
+        </p:spPr>
+        <p:txBody>
+          <a:bodyPr>
+            <a:normAutofit fontScale="92500" lnSpcReduction="20000"/>
+          </a:bodyPr>
+          <a:lstStyle>
+            <a:lvl1pPr marL="342900" indent="-342900" algn="l" defTabSz="457200" rtl="0" eaLnBrk="1" latinLnBrk="0" hangingPunct="1">
+              <a:spcBef>
+                <a:spcPct val="20000"/>
+              </a:spcBef>
+              <a:buFont typeface="Arial"/>
+              <a:buChar char="•"/>
+              <a:defRPr sz="3200" kern="1200">
+                <a:solidFill>
+                  <a:schemeClr val="bg1"/>
+                </a:solidFill>
+                <a:latin typeface="Arial" panose="020B0604020202020204" pitchFamily="34" charset="0"/>
+                <a:ea typeface="+mn-ea"/>
+                <a:cs typeface="Arial" panose="020B0604020202020204" pitchFamily="34" charset="0"/>
+              </a:defRPr>
+            </a:lvl1pPr>
+            <a:lvl2pPr marL="742950" indent="-285750" algn="l" defTabSz="457200" rtl="0" eaLnBrk="1" latinLnBrk="0" hangingPunct="1">
+              <a:spcBef>
+                <a:spcPct val="20000"/>
+              </a:spcBef>
+              <a:buFont typeface="Arial"/>
+              <a:buChar char="–"/>
+              <a:defRPr sz="2800" kern="1200">
+                <a:solidFill>
+                  <a:schemeClr val="bg1"/>
+                </a:solidFill>
+                <a:latin typeface="Arial" panose="020B0604020202020204" pitchFamily="34" charset="0"/>
+                <a:ea typeface="+mn-ea"/>
+                <a:cs typeface="Arial" panose="020B0604020202020204" pitchFamily="34" charset="0"/>
+              </a:defRPr>
+            </a:lvl2pPr>
+            <a:lvl3pPr marL="1143000" indent="-228600" algn="l" defTabSz="457200" rtl="0" eaLnBrk="1" latinLnBrk="0" hangingPunct="1">
+              <a:spcBef>
+                <a:spcPct val="20000"/>
+              </a:spcBef>
+              <a:buFont typeface="Arial"/>
+              <a:buChar char="•"/>
+              <a:defRPr sz="2400" kern="1200">
+                <a:solidFill>
+                  <a:schemeClr val="bg1"/>
+                </a:solidFill>
+                <a:latin typeface="Arial" panose="020B0604020202020204" pitchFamily="34" charset="0"/>
+                <a:ea typeface="+mn-ea"/>
+                <a:cs typeface="Arial" panose="020B0604020202020204" pitchFamily="34" charset="0"/>
+              </a:defRPr>
+            </a:lvl3pPr>
+            <a:lvl4pPr marL="1600200" indent="-228600" algn="l" defTabSz="457200" rtl="0" eaLnBrk="1" latinLnBrk="0" hangingPunct="1">
+              <a:spcBef>
+                <a:spcPct val="20000"/>
+              </a:spcBef>
+              <a:buFont typeface="Arial"/>
+              <a:buChar char="–"/>
+              <a:defRPr sz="2000" kern="1200">
+                <a:solidFill>
+                  <a:schemeClr val="bg1"/>
+                </a:solidFill>
+                <a:latin typeface="Arial" panose="020B0604020202020204" pitchFamily="34" charset="0"/>
+                <a:ea typeface="+mn-ea"/>
+                <a:cs typeface="Arial" panose="020B0604020202020204" pitchFamily="34" charset="0"/>
+              </a:defRPr>
+            </a:lvl4pPr>
+            <a:lvl5pPr marL="2057400" indent="-228600" algn="l" defTabSz="457200" rtl="0" eaLnBrk="1" latinLnBrk="0" hangingPunct="1">
+              <a:spcBef>
+                <a:spcPct val="20000"/>
+              </a:spcBef>
+              <a:buFont typeface="Arial"/>
+              <a:buChar char="»"/>
+              <a:defRPr sz="2000" kern="1200">
+                <a:solidFill>
+                  <a:schemeClr val="bg1"/>
+                </a:solidFill>
+                <a:latin typeface="Arial" panose="020B0604020202020204" pitchFamily="34" charset="0"/>
+                <a:ea typeface="+mn-ea"/>
+                <a:cs typeface="Arial" panose="020B0604020202020204" pitchFamily="34" charset="0"/>
+              </a:defRPr>
+            </a:lvl5pPr>
+            <a:lvl6pPr marL="2514600" indent="-228600" algn="l" defTabSz="457200" rtl="0" eaLnBrk="1" latinLnBrk="0" hangingPunct="1">
+              <a:spcBef>
+                <a:spcPct val="20000"/>
+              </a:spcBef>
+              <a:buFont typeface="Arial"/>
+              <a:buChar char="•"/>
+              <a:defRPr sz="2000" kern="1200">
+                <a:solidFill>
+                  <a:schemeClr val="tx1"/>
+                </a:solidFill>
+                <a:latin typeface="+mn-lt"/>
+                <a:ea typeface="+mn-ea"/>
+                <a:cs typeface="+mn-cs"/>
+              </a:defRPr>
+            </a:lvl6pPr>
+            <a:lvl7pPr marL="2971800" indent="-228600" algn="l" defTabSz="457200" rtl="0" eaLnBrk="1" latinLnBrk="0" hangingPunct="1">
+              <a:spcBef>
+                <a:spcPct val="20000"/>
+              </a:spcBef>
+              <a:buFont typeface="Arial"/>
+              <a:buChar char="•"/>
+              <a:defRPr sz="2000" kern="1200">
+                <a:solidFill>
+                  <a:schemeClr val="tx1"/>
+                </a:solidFill>
+                <a:latin typeface="+mn-lt"/>
+                <a:ea typeface="+mn-ea"/>
+                <a:cs typeface="+mn-cs"/>
+              </a:defRPr>
+            </a:lvl7pPr>
+            <a:lvl8pPr marL="3429000" indent="-228600" algn="l" defTabSz="457200" rtl="0" eaLnBrk="1" latinLnBrk="0" hangingPunct="1">
+              <a:spcBef>
+                <a:spcPct val="20000"/>
+              </a:spcBef>
+              <a:buFont typeface="Arial"/>
+              <a:buChar char="•"/>
+              <a:defRPr sz="2000" kern="1200">
+                <a:solidFill>
+                  <a:schemeClr val="tx1"/>
+                </a:solidFill>
+                <a:latin typeface="+mn-lt"/>
+                <a:ea typeface="+mn-ea"/>
+                <a:cs typeface="+mn-cs"/>
+              </a:defRPr>
+            </a:lvl8pPr>
+            <a:lvl9pPr marL="3886200" indent="-228600" algn="l" defTabSz="457200" rtl="0" eaLnBrk="1" latinLnBrk="0" hangingPunct="1">
+              <a:spcBef>
+                <a:spcPct val="20000"/>
+              </a:spcBef>
+              <a:buFont typeface="Arial"/>
+              <a:buChar char="•"/>
+              <a:defRPr sz="2000" kern="1200">
+                <a:solidFill>
+                  <a:schemeClr val="tx1"/>
+                </a:solidFill>
+                <a:latin typeface="+mn-lt"/>
+                <a:ea typeface="+mn-ea"/>
+                <a:cs typeface="+mn-cs"/>
+              </a:defRPr>
+            </a:lvl9pPr>
+          </a:lstStyle>
+          <a:p>
+            <a:pPr marL="0" indent="0">
+              <a:buFont typeface="Arial"/>
+              <a:buNone/>
+            </a:pPr>
+            <a:r>
+              <a:rPr lang="en-US" sz="1400" dirty="0"/>
+              <a:t>Simply because these dependencies have been declared to be on the Java </a:t>
+            </a:r>
+            <a:r>
+              <a:rPr lang="en-US" sz="1400" dirty="0" err="1"/>
+              <a:t>classpath</a:t>
+            </a:r>
+            <a:r>
+              <a:rPr lang="en-US" sz="1400" dirty="0"/>
+              <a:t> we’ve enabled JPA. Spring Boot will auto-configure a </a:t>
+            </a:r>
+            <a:r>
+              <a:rPr lang="en-US" sz="1400" b="1" dirty="0" err="1"/>
+              <a:t>DataSource</a:t>
+            </a:r>
+            <a:r>
+              <a:rPr lang="en-US" sz="1400" dirty="0"/>
+              <a:t> and other helpful lower-level infra to support working with an RDBMS via a JDBC driver.</a:t>
+            </a:r>
+          </a:p>
+        </p:txBody>
+      </p:sp>
       <p:pic>
         <p:nvPicPr>
-          <p:cNvPr id="10" name="Picture 9"/>
+          <p:cNvPr id="14" name="Picture 13">
+            <a:extLst>
+              <a:ext uri="{FF2B5EF4-FFF2-40B4-BE49-F238E27FC236}">
+                <a16:creationId xmlns:a16="http://schemas.microsoft.com/office/drawing/2014/main" id="{52F33CBA-8D18-CC4E-B8B2-DD2095FFFF6E}"/>
+              </a:ext>
+            </a:extLst>
+          </p:cNvPr>
           <p:cNvPicPr>
             <a:picLocks noChangeAspect="1"/>
           </p:cNvPicPr>
@@ -8428,276 +8375,92 @@
         </p:blipFill>
         <p:spPr>
           <a:xfrm>
-            <a:off x="3340100" y="3677920"/>
-            <a:ext cx="4051300" cy="660400"/>
+            <a:off x="3532179" y="1476683"/>
+            <a:ext cx="5296861" cy="748812"/>
           </a:xfrm>
           <a:prstGeom prst="rect">
             <a:avLst/>
           </a:prstGeom>
         </p:spPr>
       </p:pic>
-      <p:sp>
-        <p:nvSpPr>
-          <p:cNvPr id="11" name="Content Placeholder 2"/>
-          <p:cNvSpPr txBox="1">
-            <a:spLocks/>
-          </p:cNvSpPr>
+      <p:cxnSp>
+        <p:nvCxnSpPr>
+          <p:cNvPr id="16" name="Straight Arrow Connector 15">
+            <a:extLst>
+              <a:ext uri="{FF2B5EF4-FFF2-40B4-BE49-F238E27FC236}">
+                <a16:creationId xmlns:a16="http://schemas.microsoft.com/office/drawing/2014/main" id="{E2EE5803-24C6-C747-B30B-78B7DD464672}"/>
+              </a:ext>
+            </a:extLst>
+          </p:cNvPr>
+          <p:cNvCxnSpPr/>
           <p:nvPr/>
-        </p:nvSpPr>
+        </p:nvCxnSpPr>
         <p:spPr>
-          <a:xfrm>
-            <a:off x="457199" y="3576955"/>
-            <a:ext cx="2672081" cy="934084"/>
+          <a:xfrm flipH="1" flipV="1">
+            <a:off x="3042920" y="1476078"/>
+            <a:ext cx="768361" cy="279792"/>
           </a:xfrm>
-          <a:prstGeom prst="rect">
+          <a:prstGeom prst="straightConnector1">
             <a:avLst/>
           </a:prstGeom>
+          <a:ln>
+            <a:tailEnd type="triangle"/>
+          </a:ln>
         </p:spPr>
-        <p:txBody>
-          <a:bodyPr>
-            <a:normAutofit lnSpcReduction="10000"/>
-          </a:bodyPr>
-          <a:lstStyle>
-            <a:lvl1pPr marL="342900" indent="-342900" algn="l" defTabSz="457200" rtl="0" eaLnBrk="1" latinLnBrk="0" hangingPunct="1">
-              <a:spcBef>
-                <a:spcPct val="20000"/>
-              </a:spcBef>
-              <a:buFont typeface="Arial"/>
-              <a:buChar char="•"/>
-              <a:defRPr sz="3200" kern="1200">
-                <a:solidFill>
-                  <a:schemeClr val="bg1"/>
-                </a:solidFill>
-                <a:latin typeface="Arial" panose="020B0604020202020204" pitchFamily="34" charset="0"/>
-                <a:ea typeface="+mn-ea"/>
-                <a:cs typeface="Arial" panose="020B0604020202020204" pitchFamily="34" charset="0"/>
-              </a:defRPr>
-            </a:lvl1pPr>
-            <a:lvl2pPr marL="742950" indent="-285750" algn="l" defTabSz="457200" rtl="0" eaLnBrk="1" latinLnBrk="0" hangingPunct="1">
-              <a:spcBef>
-                <a:spcPct val="20000"/>
-              </a:spcBef>
-              <a:buFont typeface="Arial"/>
-              <a:buChar char="–"/>
-              <a:defRPr sz="2800" kern="1200">
-                <a:solidFill>
-                  <a:schemeClr val="bg1"/>
-                </a:solidFill>
-                <a:latin typeface="Arial" panose="020B0604020202020204" pitchFamily="34" charset="0"/>
-                <a:ea typeface="+mn-ea"/>
-                <a:cs typeface="Arial" panose="020B0604020202020204" pitchFamily="34" charset="0"/>
-              </a:defRPr>
-            </a:lvl2pPr>
-            <a:lvl3pPr marL="1143000" indent="-228600" algn="l" defTabSz="457200" rtl="0" eaLnBrk="1" latinLnBrk="0" hangingPunct="1">
-              <a:spcBef>
-                <a:spcPct val="20000"/>
-              </a:spcBef>
-              <a:buFont typeface="Arial"/>
-              <a:buChar char="•"/>
-              <a:defRPr sz="2400" kern="1200">
-                <a:solidFill>
-                  <a:schemeClr val="bg1"/>
-                </a:solidFill>
-                <a:latin typeface="Arial" panose="020B0604020202020204" pitchFamily="34" charset="0"/>
-                <a:ea typeface="+mn-ea"/>
-                <a:cs typeface="Arial" panose="020B0604020202020204" pitchFamily="34" charset="0"/>
-              </a:defRPr>
-            </a:lvl3pPr>
-            <a:lvl4pPr marL="1600200" indent="-228600" algn="l" defTabSz="457200" rtl="0" eaLnBrk="1" latinLnBrk="0" hangingPunct="1">
-              <a:spcBef>
-                <a:spcPct val="20000"/>
-              </a:spcBef>
-              <a:buFont typeface="Arial"/>
-              <a:buChar char="–"/>
-              <a:defRPr sz="2000" kern="1200">
-                <a:solidFill>
-                  <a:schemeClr val="bg1"/>
-                </a:solidFill>
-                <a:latin typeface="Arial" panose="020B0604020202020204" pitchFamily="34" charset="0"/>
-                <a:ea typeface="+mn-ea"/>
-                <a:cs typeface="Arial" panose="020B0604020202020204" pitchFamily="34" charset="0"/>
-              </a:defRPr>
-            </a:lvl4pPr>
-            <a:lvl5pPr marL="2057400" indent="-228600" algn="l" defTabSz="457200" rtl="0" eaLnBrk="1" latinLnBrk="0" hangingPunct="1">
-              <a:spcBef>
-                <a:spcPct val="20000"/>
-              </a:spcBef>
-              <a:buFont typeface="Arial"/>
-              <a:buChar char="»"/>
-              <a:defRPr sz="2000" kern="1200">
-                <a:solidFill>
-                  <a:schemeClr val="bg1"/>
-                </a:solidFill>
-                <a:latin typeface="Arial" panose="020B0604020202020204" pitchFamily="34" charset="0"/>
-                <a:ea typeface="+mn-ea"/>
-                <a:cs typeface="Arial" panose="020B0604020202020204" pitchFamily="34" charset="0"/>
-              </a:defRPr>
-            </a:lvl5pPr>
-            <a:lvl6pPr marL="2514600" indent="-228600" algn="l" defTabSz="457200" rtl="0" eaLnBrk="1" latinLnBrk="0" hangingPunct="1">
-              <a:spcBef>
-                <a:spcPct val="20000"/>
-              </a:spcBef>
-              <a:buFont typeface="Arial"/>
-              <a:buChar char="•"/>
-              <a:defRPr sz="2000" kern="1200">
-                <a:solidFill>
-                  <a:schemeClr val="tx1"/>
-                </a:solidFill>
-                <a:latin typeface="+mn-lt"/>
-                <a:ea typeface="+mn-ea"/>
-                <a:cs typeface="+mn-cs"/>
-              </a:defRPr>
-            </a:lvl6pPr>
-            <a:lvl7pPr marL="2971800" indent="-228600" algn="l" defTabSz="457200" rtl="0" eaLnBrk="1" latinLnBrk="0" hangingPunct="1">
-              <a:spcBef>
-                <a:spcPct val="20000"/>
-              </a:spcBef>
-              <a:buFont typeface="Arial"/>
-              <a:buChar char="•"/>
-              <a:defRPr sz="2000" kern="1200">
-                <a:solidFill>
-                  <a:schemeClr val="tx1"/>
-                </a:solidFill>
-                <a:latin typeface="+mn-lt"/>
-                <a:ea typeface="+mn-ea"/>
-                <a:cs typeface="+mn-cs"/>
-              </a:defRPr>
-            </a:lvl7pPr>
-            <a:lvl8pPr marL="3429000" indent="-228600" algn="l" defTabSz="457200" rtl="0" eaLnBrk="1" latinLnBrk="0" hangingPunct="1">
-              <a:spcBef>
-                <a:spcPct val="20000"/>
-              </a:spcBef>
-              <a:buFont typeface="Arial"/>
-              <a:buChar char="•"/>
-              <a:defRPr sz="2000" kern="1200">
-                <a:solidFill>
-                  <a:schemeClr val="tx1"/>
-                </a:solidFill>
-                <a:latin typeface="+mn-lt"/>
-                <a:ea typeface="+mn-ea"/>
-                <a:cs typeface="+mn-cs"/>
-              </a:defRPr>
-            </a:lvl8pPr>
-            <a:lvl9pPr marL="3886200" indent="-228600" algn="l" defTabSz="457200" rtl="0" eaLnBrk="1" latinLnBrk="0" hangingPunct="1">
-              <a:spcBef>
-                <a:spcPct val="20000"/>
-              </a:spcBef>
-              <a:buFont typeface="Arial"/>
-              <a:buChar char="•"/>
-              <a:defRPr sz="2000" kern="1200">
-                <a:solidFill>
-                  <a:schemeClr val="tx1"/>
-                </a:solidFill>
-                <a:latin typeface="+mn-lt"/>
-                <a:ea typeface="+mn-ea"/>
-                <a:cs typeface="+mn-cs"/>
-              </a:defRPr>
-            </a:lvl9pPr>
-          </a:lstStyle>
-          <a:p>
-            <a:pPr marL="0" indent="0">
-              <a:buFont typeface="Arial"/>
-              <a:buNone/>
-            </a:pPr>
-            <a:r>
-              <a:rPr lang="en-US" sz="1400" dirty="0" smtClean="0"/>
-              <a:t>Sprinkle a little </a:t>
-            </a:r>
-            <a:r>
-              <a:rPr lang="en-US" sz="1400" b="1" dirty="0" smtClean="0"/>
-              <a:t>@EnableJpaRepositories </a:t>
-            </a:r>
-            <a:r>
-              <a:rPr lang="en-US" sz="1400" dirty="0" smtClean="0"/>
-              <a:t>annotation into our Spring Boot application</a:t>
-            </a:r>
-          </a:p>
-        </p:txBody>
-      </p:sp>
-      <p:pic>
-        <p:nvPicPr>
-          <p:cNvPr id="12" name="Picture 11"/>
-          <p:cNvPicPr>
-            <a:picLocks noChangeAspect="1"/>
-          </p:cNvPicPr>
+        <p:style>
+          <a:lnRef idx="2">
+            <a:schemeClr val="accent1"/>
+          </a:lnRef>
+          <a:fillRef idx="0">
+            <a:schemeClr val="accent1"/>
+          </a:fillRef>
+          <a:effectRef idx="1">
+            <a:schemeClr val="accent1"/>
+          </a:effectRef>
+          <a:fontRef idx="minor">
+            <a:schemeClr val="tx1"/>
+          </a:fontRef>
+        </p:style>
+      </p:cxnSp>
+      <p:cxnSp>
+        <p:nvCxnSpPr>
+          <p:cNvPr id="18" name="Straight Arrow Connector 17">
+            <a:extLst>
+              <a:ext uri="{FF2B5EF4-FFF2-40B4-BE49-F238E27FC236}">
+                <a16:creationId xmlns:a16="http://schemas.microsoft.com/office/drawing/2014/main" id="{D6CD3FE2-8679-7646-A993-806396D83019}"/>
+              </a:ext>
+            </a:extLst>
+          </p:cNvPr>
+          <p:cNvCxnSpPr/>
           <p:nvPr/>
-        </p:nvPicPr>
-        <p:blipFill>
-          <a:blip r:embed="rId4"/>
-          <a:stretch>
-            <a:fillRect/>
-          </a:stretch>
-        </p:blipFill>
+        </p:nvCxnSpPr>
         <p:spPr>
-          <a:xfrm>
-            <a:off x="3042920" y="3677920"/>
-            <a:ext cx="2625753" cy="619125"/>
+          <a:xfrm flipH="1">
+            <a:off x="2946549" y="1939898"/>
+            <a:ext cx="880100" cy="488977"/>
           </a:xfrm>
-          <a:prstGeom prst="rect">
+          <a:prstGeom prst="straightConnector1">
             <a:avLst/>
           </a:prstGeom>
+          <a:ln>
+            <a:tailEnd type="triangle"/>
+          </a:ln>
         </p:spPr>
-      </p:pic>
-      <p:pic>
-        <p:nvPicPr>
-          <p:cNvPr id="4" name="Picture 3"/>
-          <p:cNvPicPr>
-            <a:picLocks noChangeAspect="1"/>
-          </p:cNvPicPr>
-          <p:nvPr/>
-        </p:nvPicPr>
-        <p:blipFill>
-          <a:blip r:embed="rId5">
-            <a:extLst>
-              <a:ext uri="{28A0092B-C50C-407E-A947-70E740481C1C}">
-                <a14:useLocalDpi xmlns:a14="http://schemas.microsoft.com/office/drawing/2010/main" val="0"/>
-              </a:ext>
-            </a:extLst>
-          </a:blip>
-          <a:stretch>
-            <a:fillRect/>
-          </a:stretch>
-        </p:blipFill>
-        <p:spPr>
-          <a:xfrm>
-            <a:off x="3195320" y="1013171"/>
-            <a:ext cx="5491480" cy="766002"/>
-          </a:xfrm>
-          <a:prstGeom prst="rect">
-            <a:avLst/>
-          </a:prstGeom>
-        </p:spPr>
-      </p:pic>
-      <p:pic>
-        <p:nvPicPr>
-          <p:cNvPr id="5" name="Picture 4"/>
-          <p:cNvPicPr>
-            <a:picLocks noChangeAspect="1"/>
-          </p:cNvPicPr>
-          <p:nvPr/>
-        </p:nvPicPr>
-        <p:blipFill>
-          <a:blip r:embed="rId6">
-            <a:extLst>
-              <a:ext uri="{28A0092B-C50C-407E-A947-70E740481C1C}">
-                <a14:useLocalDpi xmlns:a14="http://schemas.microsoft.com/office/drawing/2010/main" val="0"/>
-              </a:ext>
-            </a:extLst>
-          </a:blip>
-          <a:stretch>
-            <a:fillRect/>
-          </a:stretch>
-        </p:blipFill>
-        <p:spPr>
-          <a:xfrm>
-            <a:off x="3195320" y="2195988"/>
-            <a:ext cx="2606040" cy="622495"/>
-          </a:xfrm>
-          <a:prstGeom prst="rect">
-            <a:avLst/>
-          </a:prstGeom>
-        </p:spPr>
-      </p:pic>
+        <p:style>
+          <a:lnRef idx="2">
+            <a:schemeClr val="accent1"/>
+          </a:lnRef>
+          <a:fillRef idx="0">
+            <a:schemeClr val="accent1"/>
+          </a:fillRef>
+          <a:effectRef idx="1">
+            <a:schemeClr val="accent1"/>
+          </a:effectRef>
+          <a:fontRef idx="minor">
+            <a:schemeClr val="tx1"/>
+          </a:fontRef>
+        </p:style>
+      </p:cxnSp>
     </p:spTree>
     <p:extLst>
       <p:ext uri="{BB962C8B-B14F-4D97-AF65-F5344CB8AC3E}">
@@ -8708,21 +8471,6 @@
   <p:clrMapOvr>
     <a:masterClrMapping/>
   </p:clrMapOvr>
-  <mc:AlternateContent xmlns:mc="http://schemas.openxmlformats.org/markup-compatibility/2006" xmlns:p14="http://schemas.microsoft.com/office/powerpoint/2010/main">
-    <mc:Choice Requires="p14">
-      <p:transition spd="slow" p14:dur="2000"/>
-    </mc:Choice>
-    <mc:Fallback xmlns="">
-      <p:transition xmlns:p14="http://schemas.microsoft.com/office/powerpoint/2010/main" spd="slow"/>
-    </mc:Fallback>
-  </mc:AlternateContent>
-  <p:timing>
-    <p:tnLst>
-      <p:par>
-        <p:cTn id="1" dur="indefinite" restart="never" nodeType="tmRoot"/>
-      </p:par>
-    </p:tnLst>
-  </p:timing>
 </p:sld>
 </file>
 
@@ -8760,45 +8508,13 @@
           <a:p>
             <a:r>
               <a:rPr lang="en-US" dirty="0"/>
-              <a:t>Spring Data JPA, @Entity &amp; Repository</a:t>
+              <a:t>Spring Data REST</a:t>
             </a:r>
             <a:endParaRPr lang="en-US" dirty="0">
               <a:solidFill>
                 <a:srgbClr val="138A7E"/>
               </a:solidFill>
             </a:endParaRPr>
-          </a:p>
-        </p:txBody>
-      </p:sp>
-      <p:sp>
-        <p:nvSpPr>
-          <p:cNvPr id="3" name="Content Placeholder 2"/>
-          <p:cNvSpPr>
-            <a:spLocks noGrp="1"/>
-          </p:cNvSpPr>
-          <p:nvPr>
-            <p:ph sz="quarter" idx="10"/>
-          </p:nvPr>
-        </p:nvSpPr>
-        <p:spPr>
-          <a:xfrm>
-            <a:off x="457199" y="1108075"/>
-            <a:ext cx="2976881" cy="629285"/>
-          </a:xfrm>
-        </p:spPr>
-        <p:txBody>
-          <a:bodyPr>
-            <a:normAutofit/>
-          </a:bodyPr>
-          <a:lstStyle/>
-          <a:p>
-            <a:pPr marL="0" indent="0">
-              <a:buNone/>
-            </a:pPr>
-            <a:r>
-              <a:rPr lang="en-US" sz="1400" dirty="0" smtClean="0"/>
-              <a:t>Let’s create an @Entity to manage</a:t>
-            </a:r>
           </a:p>
         </p:txBody>
       </p:sp>
@@ -8965,13 +8681,104 @@
               <a:buFont typeface="Arial"/>
               <a:buNone/>
             </a:pPr>
-            <a:endParaRPr lang="en-US" sz="1400" dirty="0" smtClean="0"/>
+            <a:endParaRPr lang="en-US" sz="1400" dirty="0"/>
           </a:p>
         </p:txBody>
       </p:sp>
       <p:sp>
         <p:nvSpPr>
-          <p:cNvPr id="6" name="Content Placeholder 2"/>
+          <p:cNvPr id="4" name="Rectangle 3"/>
+          <p:cNvSpPr/>
+          <p:nvPr/>
+        </p:nvSpPr>
+        <p:spPr>
+          <a:xfrm>
+            <a:off x="457198" y="1012327"/>
+            <a:ext cx="8229601" cy="646331"/>
+          </a:xfrm>
+          <a:prstGeom prst="rect">
+            <a:avLst/>
+          </a:prstGeom>
+        </p:spPr>
+        <p:txBody>
+          <a:bodyPr wrap="square">
+            <a:spAutoFit/>
+          </a:bodyPr>
+          <a:lstStyle/>
+          <a:p>
+            <a:pPr marL="203200" lvl="0" indent="0">
+              <a:buNone/>
+            </a:pPr>
+            <a:r>
+              <a:rPr lang="en-US" dirty="0">
+                <a:solidFill>
+                  <a:srgbClr val="FFFFFF"/>
+                </a:solidFill>
+              </a:rPr>
+              <a:t>Goal is to provide a solid foundation on which to expose </a:t>
+            </a:r>
+            <a:r>
+              <a:rPr lang="en-US" b="1" i="1" u="sng" dirty="0">
+                <a:solidFill>
+                  <a:srgbClr val="FFFFFF"/>
+                </a:solidFill>
+              </a:rPr>
+              <a:t>CRUD</a:t>
+            </a:r>
+            <a:r>
+              <a:rPr lang="en-US" dirty="0">
+                <a:solidFill>
+                  <a:srgbClr val="FFFFFF"/>
+                </a:solidFill>
+              </a:rPr>
+              <a:t> repositories to our </a:t>
+            </a:r>
+            <a:r>
+              <a:rPr lang="en-US" i="1" u="sng" dirty="0">
+                <a:solidFill>
+                  <a:srgbClr val="FFFFFF"/>
+                </a:solidFill>
+              </a:rPr>
+              <a:t>repository managing entities</a:t>
+            </a:r>
+            <a:r>
+              <a:rPr lang="en-US" dirty="0">
+                <a:solidFill>
+                  <a:srgbClr val="FFFFFF"/>
+                </a:solidFill>
+              </a:rPr>
+              <a:t> using plain </a:t>
+            </a:r>
+            <a:r>
+              <a:rPr lang="en-US" b="1" i="1" u="sng" dirty="0">
+                <a:solidFill>
+                  <a:srgbClr val="FFFFFF"/>
+                </a:solidFill>
+              </a:rPr>
+              <a:t>HTTP REST</a:t>
+            </a:r>
+            <a:r>
+              <a:rPr lang="en-US" b="1" dirty="0">
+                <a:solidFill>
+                  <a:srgbClr val="FFFFFF"/>
+                </a:solidFill>
+              </a:rPr>
+              <a:t> </a:t>
+            </a:r>
+            <a:r>
+              <a:rPr lang="en-US" dirty="0">
+                <a:solidFill>
+                  <a:srgbClr val="FFFFFF"/>
+                </a:solidFill>
+              </a:rPr>
+              <a:t>semantics</a:t>
+            </a:r>
+          </a:p>
+        </p:txBody>
+      </p:sp>
+      <p:sp>
+        <p:nvSpPr>
+          <p:cNvPr id="8" name="Content Placeholder 2"/>
           <p:cNvSpPr txBox="1">
             <a:spLocks/>
           </p:cNvSpPr>
@@ -8979,7 +8786,7 @@
         </p:nvSpPr>
         <p:spPr>
           <a:xfrm>
-            <a:off x="457199" y="2256155"/>
+            <a:off x="457199" y="2508320"/>
             <a:ext cx="2672081" cy="629285"/>
           </a:xfrm>
           <a:prstGeom prst="rect">
@@ -8988,7 +8795,7 @@
         </p:spPr>
         <p:txBody>
           <a:bodyPr>
-            <a:normAutofit/>
+            <a:normAutofit fontScale="92500"/>
           </a:bodyPr>
           <a:lstStyle>
             <a:lvl1pPr marL="342900" indent="-342900" algn="l" defTabSz="457200" rtl="0" eaLnBrk="1" latinLnBrk="0" hangingPunct="1">
@@ -9132,183 +8939,34 @@
               <a:buFont typeface="Arial"/>
               <a:buNone/>
             </a:pPr>
-            <a:endParaRPr lang="en-US" sz="1400" dirty="0" smtClean="0"/>
-          </a:p>
-        </p:txBody>
-      </p:sp>
-      <p:sp>
-        <p:nvSpPr>
-          <p:cNvPr id="10" name="Content Placeholder 2"/>
-          <p:cNvSpPr txBox="1">
-            <a:spLocks/>
-          </p:cNvSpPr>
-          <p:nvPr/>
-        </p:nvSpPr>
-        <p:spPr>
-          <a:xfrm>
-            <a:off x="439419" y="3140075"/>
-            <a:ext cx="2001521" cy="1472564"/>
-          </a:xfrm>
-          <a:prstGeom prst="rect">
-            <a:avLst/>
-          </a:prstGeom>
-        </p:spPr>
-        <p:txBody>
-          <a:bodyPr>
-            <a:normAutofit/>
-          </a:bodyPr>
-          <a:lstStyle>
-            <a:lvl1pPr marL="342900" indent="-342900" algn="l" defTabSz="457200" rtl="0" eaLnBrk="1" latinLnBrk="0" hangingPunct="1">
-              <a:spcBef>
-                <a:spcPct val="20000"/>
-              </a:spcBef>
-              <a:buFont typeface="Arial"/>
-              <a:buChar char="•"/>
-              <a:defRPr sz="3200" kern="1200">
-                <a:solidFill>
-                  <a:schemeClr val="bg1"/>
-                </a:solidFill>
-                <a:latin typeface="Arial" panose="020B0604020202020204" pitchFamily="34" charset="0"/>
-                <a:ea typeface="+mn-ea"/>
-                <a:cs typeface="Arial" panose="020B0604020202020204" pitchFamily="34" charset="0"/>
-              </a:defRPr>
-            </a:lvl1pPr>
-            <a:lvl2pPr marL="742950" indent="-285750" algn="l" defTabSz="457200" rtl="0" eaLnBrk="1" latinLnBrk="0" hangingPunct="1">
-              <a:spcBef>
-                <a:spcPct val="20000"/>
-              </a:spcBef>
-              <a:buFont typeface="Arial"/>
-              <a:buChar char="–"/>
-              <a:defRPr sz="2800" kern="1200">
-                <a:solidFill>
-                  <a:schemeClr val="bg1"/>
-                </a:solidFill>
-                <a:latin typeface="Arial" panose="020B0604020202020204" pitchFamily="34" charset="0"/>
-                <a:ea typeface="+mn-ea"/>
-                <a:cs typeface="Arial" panose="020B0604020202020204" pitchFamily="34" charset="0"/>
-              </a:defRPr>
-            </a:lvl2pPr>
-            <a:lvl3pPr marL="1143000" indent="-228600" algn="l" defTabSz="457200" rtl="0" eaLnBrk="1" latinLnBrk="0" hangingPunct="1">
-              <a:spcBef>
-                <a:spcPct val="20000"/>
-              </a:spcBef>
-              <a:buFont typeface="Arial"/>
-              <a:buChar char="•"/>
-              <a:defRPr sz="2400" kern="1200">
-                <a:solidFill>
-                  <a:schemeClr val="bg1"/>
-                </a:solidFill>
-                <a:latin typeface="Arial" panose="020B0604020202020204" pitchFamily="34" charset="0"/>
-                <a:ea typeface="+mn-ea"/>
-                <a:cs typeface="Arial" panose="020B0604020202020204" pitchFamily="34" charset="0"/>
-              </a:defRPr>
-            </a:lvl3pPr>
-            <a:lvl4pPr marL="1600200" indent="-228600" algn="l" defTabSz="457200" rtl="0" eaLnBrk="1" latinLnBrk="0" hangingPunct="1">
-              <a:spcBef>
-                <a:spcPct val="20000"/>
-              </a:spcBef>
-              <a:buFont typeface="Arial"/>
-              <a:buChar char="–"/>
-              <a:defRPr sz="2000" kern="1200">
-                <a:solidFill>
-                  <a:schemeClr val="bg1"/>
-                </a:solidFill>
-                <a:latin typeface="Arial" panose="020B0604020202020204" pitchFamily="34" charset="0"/>
-                <a:ea typeface="+mn-ea"/>
-                <a:cs typeface="Arial" panose="020B0604020202020204" pitchFamily="34" charset="0"/>
-              </a:defRPr>
-            </a:lvl4pPr>
-            <a:lvl5pPr marL="2057400" indent="-228600" algn="l" defTabSz="457200" rtl="0" eaLnBrk="1" latinLnBrk="0" hangingPunct="1">
-              <a:spcBef>
-                <a:spcPct val="20000"/>
-              </a:spcBef>
-              <a:buFont typeface="Arial"/>
-              <a:buChar char="»"/>
-              <a:defRPr sz="2000" kern="1200">
-                <a:solidFill>
-                  <a:schemeClr val="bg1"/>
-                </a:solidFill>
-                <a:latin typeface="Arial" panose="020B0604020202020204" pitchFamily="34" charset="0"/>
-                <a:ea typeface="+mn-ea"/>
-                <a:cs typeface="Arial" panose="020B0604020202020204" pitchFamily="34" charset="0"/>
-              </a:defRPr>
-            </a:lvl5pPr>
-            <a:lvl6pPr marL="2514600" indent="-228600" algn="l" defTabSz="457200" rtl="0" eaLnBrk="1" latinLnBrk="0" hangingPunct="1">
-              <a:spcBef>
-                <a:spcPct val="20000"/>
-              </a:spcBef>
-              <a:buFont typeface="Arial"/>
-              <a:buChar char="•"/>
-              <a:defRPr sz="2000" kern="1200">
-                <a:solidFill>
-                  <a:schemeClr val="tx1"/>
-                </a:solidFill>
-                <a:latin typeface="+mn-lt"/>
-                <a:ea typeface="+mn-ea"/>
-                <a:cs typeface="+mn-cs"/>
-              </a:defRPr>
-            </a:lvl6pPr>
-            <a:lvl7pPr marL="2971800" indent="-228600" algn="l" defTabSz="457200" rtl="0" eaLnBrk="1" latinLnBrk="0" hangingPunct="1">
-              <a:spcBef>
-                <a:spcPct val="20000"/>
-              </a:spcBef>
-              <a:buFont typeface="Arial"/>
-              <a:buChar char="•"/>
-              <a:defRPr sz="2000" kern="1200">
-                <a:solidFill>
-                  <a:schemeClr val="tx1"/>
-                </a:solidFill>
-                <a:latin typeface="+mn-lt"/>
-                <a:ea typeface="+mn-ea"/>
-                <a:cs typeface="+mn-cs"/>
-              </a:defRPr>
-            </a:lvl7pPr>
-            <a:lvl8pPr marL="3429000" indent="-228600" algn="l" defTabSz="457200" rtl="0" eaLnBrk="1" latinLnBrk="0" hangingPunct="1">
-              <a:spcBef>
-                <a:spcPct val="20000"/>
-              </a:spcBef>
-              <a:buFont typeface="Arial"/>
-              <a:buChar char="•"/>
-              <a:defRPr sz="2000" kern="1200">
-                <a:solidFill>
-                  <a:schemeClr val="tx1"/>
-                </a:solidFill>
-                <a:latin typeface="+mn-lt"/>
-                <a:ea typeface="+mn-ea"/>
-                <a:cs typeface="+mn-cs"/>
-              </a:defRPr>
-            </a:lvl8pPr>
-            <a:lvl9pPr marL="3886200" indent="-228600" algn="l" defTabSz="457200" rtl="0" eaLnBrk="1" latinLnBrk="0" hangingPunct="1">
-              <a:spcBef>
-                <a:spcPct val="20000"/>
-              </a:spcBef>
-              <a:buFont typeface="Arial"/>
-              <a:buChar char="•"/>
-              <a:defRPr sz="2000" kern="1200">
-                <a:solidFill>
-                  <a:schemeClr val="tx1"/>
-                </a:solidFill>
-                <a:latin typeface="+mn-lt"/>
-                <a:ea typeface="+mn-ea"/>
-                <a:cs typeface="+mn-cs"/>
-              </a:defRPr>
-            </a:lvl9pPr>
-          </a:lstStyle>
-          <a:p>
-            <a:pPr marL="0" indent="0">
-              <a:buFont typeface="Arial"/>
-              <a:buNone/>
-            </a:pPr>
             <a:r>
-              <a:rPr lang="en-US" sz="1400" dirty="0" smtClean="0"/>
-              <a:t>Let’s create a JPA Repository to manage our @Entity</a:t>
+              <a:rPr lang="en-US" sz="1400" dirty="0"/>
+              <a:t>Add a dash of Spring Data REST starter into our </a:t>
+            </a:r>
+            <a:r>
+              <a:rPr lang="en-US" sz="1400" b="1" dirty="0" err="1"/>
+              <a:t>build.gradle</a:t>
+            </a:r>
+            <a:r>
+              <a:rPr lang="en-US" sz="1400" b="1" dirty="0"/>
+              <a:t> </a:t>
+            </a:r>
+            <a:r>
+              <a:rPr lang="en-US" sz="1400" dirty="0"/>
+              <a:t>file</a:t>
             </a:r>
           </a:p>
         </p:txBody>
       </p:sp>
       <p:pic>
         <p:nvPicPr>
-          <p:cNvPr id="4" name="Picture 3"/>
+          <p:cNvPr id="6" name="Picture 5">
+            <a:extLst>
+              <a:ext uri="{FF2B5EF4-FFF2-40B4-BE49-F238E27FC236}">
+                <a16:creationId xmlns:a16="http://schemas.microsoft.com/office/drawing/2014/main" id="{47E305C6-F4B0-894A-AB78-910CEFD09F7D}"/>
+              </a:ext>
+            </a:extLst>
+          </p:cNvPr>
           <p:cNvPicPr>
             <a:picLocks noChangeAspect="1"/>
           </p:cNvPicPr>
@@ -9322,32 +8980,8 @@
         </p:blipFill>
         <p:spPr>
           <a:xfrm>
-            <a:off x="3533140" y="960120"/>
-            <a:ext cx="4991100" cy="2374145"/>
-          </a:xfrm>
-          <a:prstGeom prst="rect">
-            <a:avLst/>
-          </a:prstGeom>
-        </p:spPr>
-      </p:pic>
-      <p:pic>
-        <p:nvPicPr>
-          <p:cNvPr id="5" name="Picture 4"/>
-          <p:cNvPicPr>
-            <a:picLocks noChangeAspect="1"/>
-          </p:cNvPicPr>
-          <p:nvPr/>
-        </p:nvPicPr>
-        <p:blipFill>
-          <a:blip r:embed="rId4"/>
-          <a:stretch>
-            <a:fillRect/>
-          </a:stretch>
-        </p:blipFill>
-        <p:spPr>
-          <a:xfrm>
-            <a:off x="1719580" y="3751580"/>
-            <a:ext cx="7289800" cy="635000"/>
+            <a:off x="3129280" y="2318528"/>
+            <a:ext cx="5748020" cy="1008871"/>
           </a:xfrm>
           <a:prstGeom prst="rect">
             <a:avLst/>
@@ -9357,28 +8991,13 @@
     </p:spTree>
     <p:extLst>
       <p:ext uri="{BB962C8B-B14F-4D97-AF65-F5344CB8AC3E}">
-        <p14:creationId xmlns:p14="http://schemas.microsoft.com/office/powerpoint/2010/main" val="2742572485"/>
+        <p14:creationId xmlns:p14="http://schemas.microsoft.com/office/powerpoint/2010/main" val="2204368881"/>
       </p:ext>
     </p:extLst>
   </p:cSld>
   <p:clrMapOvr>
     <a:masterClrMapping/>
   </p:clrMapOvr>
-  <mc:AlternateContent xmlns:mc="http://schemas.openxmlformats.org/markup-compatibility/2006" xmlns:p14="http://schemas.microsoft.com/office/powerpoint/2010/main">
-    <mc:Choice Requires="p14">
-      <p:transition spd="slow" p14:dur="2000"/>
-    </mc:Choice>
-    <mc:Fallback xmlns="">
-      <p:transition xmlns:p14="http://schemas.microsoft.com/office/powerpoint/2010/main" spd="slow"/>
-    </mc:Fallback>
-  </mc:AlternateContent>
-  <p:timing>
-    <p:tnLst>
-      <p:par>
-        <p:cTn id="1" dur="indefinite" restart="never" nodeType="tmRoot"/>
-      </p:par>
-    </p:tnLst>
-  </p:timing>
 </p:sld>
 </file>
 
@@ -9415,14 +9034,54 @@
           <a:lstStyle/>
           <a:p>
             <a:r>
-              <a:rPr lang="en-US" dirty="0" smtClean="0"/>
-              <a:t>Spring Data REST</a:t>
+              <a:rPr lang="en-US" dirty="0"/>
+              <a:t>Spring Data JPA, @Entity &amp; Repository</a:t>
             </a:r>
             <a:endParaRPr lang="en-US" dirty="0">
               <a:solidFill>
                 <a:srgbClr val="138A7E"/>
               </a:solidFill>
             </a:endParaRPr>
+          </a:p>
+        </p:txBody>
+      </p:sp>
+      <p:sp>
+        <p:nvSpPr>
+          <p:cNvPr id="3" name="Content Placeholder 2"/>
+          <p:cNvSpPr>
+            <a:spLocks noGrp="1"/>
+          </p:cNvSpPr>
+          <p:nvPr>
+            <p:ph sz="quarter" idx="10"/>
+          </p:nvPr>
+        </p:nvSpPr>
+        <p:spPr>
+          <a:xfrm>
+            <a:off x="2598632" y="1154571"/>
+            <a:ext cx="2976881" cy="334166"/>
+          </a:xfrm>
+        </p:spPr>
+        <p:txBody>
+          <a:bodyPr>
+            <a:normAutofit/>
+          </a:bodyPr>
+          <a:lstStyle/>
+          <a:p>
+            <a:pPr marL="0" indent="0">
+              <a:buNone/>
+            </a:pPr>
+            <a:r>
+              <a:rPr lang="en-US" sz="1400" dirty="0"/>
+              <a:t>Let’s create an </a:t>
+            </a:r>
+            <a:r>
+              <a:rPr lang="en-US" sz="1400" b="1" dirty="0"/>
+              <a:t>@Entity </a:t>
+            </a:r>
+            <a:r>
+              <a:rPr lang="en-US" sz="1400" dirty="0"/>
+              <a:t>to manage</a:t>
+            </a:r>
           </a:p>
         </p:txBody>
       </p:sp>
@@ -9589,120 +9248,13 @@
               <a:buFont typeface="Arial"/>
               <a:buNone/>
             </a:pPr>
-            <a:endParaRPr lang="en-US" sz="1400" dirty="0" smtClean="0"/>
+            <a:endParaRPr lang="en-US" sz="1400" dirty="0"/>
           </a:p>
         </p:txBody>
       </p:sp>
       <p:sp>
         <p:nvSpPr>
-          <p:cNvPr id="4" name="Rectangle 3"/>
-          <p:cNvSpPr/>
-          <p:nvPr/>
-        </p:nvSpPr>
-        <p:spPr>
-          <a:xfrm>
-            <a:off x="457198" y="1012327"/>
-            <a:ext cx="8229601" cy="646331"/>
-          </a:xfrm>
-          <a:prstGeom prst="rect">
-            <a:avLst/>
-          </a:prstGeom>
-        </p:spPr>
-        <p:txBody>
-          <a:bodyPr wrap="square">
-            <a:spAutoFit/>
-          </a:bodyPr>
-          <a:lstStyle/>
-          <a:p>
-            <a:pPr marL="203200" lvl="0" indent="0">
-              <a:buNone/>
-            </a:pPr>
-            <a:r>
-              <a:rPr lang="en-US" dirty="0">
-                <a:solidFill>
-                  <a:srgbClr val="FFFFFF"/>
-                </a:solidFill>
-              </a:rPr>
-              <a:t>Goal is to provide a solid foundation on which to expose </a:t>
-            </a:r>
-            <a:r>
-              <a:rPr lang="en-US" b="1" i="1" u="sng" dirty="0">
-                <a:solidFill>
-                  <a:srgbClr val="FFFFFF"/>
-                </a:solidFill>
-              </a:rPr>
-              <a:t>CRUD</a:t>
-            </a:r>
-            <a:r>
-              <a:rPr lang="en-US" dirty="0">
-                <a:solidFill>
-                  <a:srgbClr val="FFFFFF"/>
-                </a:solidFill>
-              </a:rPr>
-              <a:t> repositories to </a:t>
-            </a:r>
-            <a:r>
-              <a:rPr lang="en-US" dirty="0" smtClean="0">
-                <a:solidFill>
-                  <a:srgbClr val="FFFFFF"/>
-                </a:solidFill>
-              </a:rPr>
-              <a:t>our </a:t>
-            </a:r>
-            <a:r>
-              <a:rPr lang="en-US" i="1" u="sng" dirty="0" smtClean="0">
-                <a:solidFill>
-                  <a:srgbClr val="FFFFFF"/>
-                </a:solidFill>
-              </a:rPr>
-              <a:t>repository managing entities</a:t>
-            </a:r>
-            <a:r>
-              <a:rPr lang="en-US" dirty="0" smtClean="0">
-                <a:solidFill>
-                  <a:srgbClr val="FFFFFF"/>
-                </a:solidFill>
-              </a:rPr>
-              <a:t> using </a:t>
-            </a:r>
-            <a:r>
-              <a:rPr lang="en-US" dirty="0">
-                <a:solidFill>
-                  <a:srgbClr val="FFFFFF"/>
-                </a:solidFill>
-              </a:rPr>
-              <a:t>plain </a:t>
-            </a:r>
-            <a:r>
-              <a:rPr lang="en-US" b="1" i="1" u="sng" dirty="0">
-                <a:solidFill>
-                  <a:srgbClr val="FFFFFF"/>
-                </a:solidFill>
-              </a:rPr>
-              <a:t>HTTP REST</a:t>
-            </a:r>
-            <a:r>
-              <a:rPr lang="en-US" b="1" dirty="0">
-                <a:solidFill>
-                  <a:srgbClr val="FFFFFF"/>
-                </a:solidFill>
-              </a:rPr>
-              <a:t> </a:t>
-            </a:r>
-            <a:r>
-              <a:rPr lang="en-US" dirty="0">
-                <a:solidFill>
-                  <a:srgbClr val="FFFFFF"/>
-                </a:solidFill>
-              </a:rPr>
-              <a:t>semantics</a:t>
-            </a:r>
-          </a:p>
-        </p:txBody>
-      </p:sp>
-      <p:sp>
-        <p:nvSpPr>
-          <p:cNvPr id="8" name="Content Placeholder 2"/>
+          <p:cNvPr id="6" name="Content Placeholder 2"/>
           <p:cNvSpPr txBox="1">
             <a:spLocks/>
           </p:cNvSpPr>
@@ -9710,7 +9262,7 @@
         </p:nvSpPr>
         <p:spPr>
           <a:xfrm>
-            <a:off x="457199" y="2997835"/>
+            <a:off x="457199" y="2256155"/>
             <a:ext cx="2672081" cy="629285"/>
           </a:xfrm>
           <a:prstGeom prst="rect">
@@ -9719,7 +9271,7 @@
         </p:spPr>
         <p:txBody>
           <a:bodyPr>
-            <a:normAutofit fontScale="92500"/>
+            <a:normAutofit/>
           </a:bodyPr>
           <a:lstStyle>
             <a:lvl1pPr marL="342900" indent="-342900" algn="l" defTabSz="457200" rtl="0" eaLnBrk="1" latinLnBrk="0" hangingPunct="1">
@@ -9863,76 +9415,336 @@
               <a:buFont typeface="Arial"/>
               <a:buNone/>
             </a:pPr>
+            <a:endParaRPr lang="en-US" sz="1400" dirty="0"/>
+          </a:p>
+        </p:txBody>
+      </p:sp>
+      <p:sp>
+        <p:nvSpPr>
+          <p:cNvPr id="10" name="Content Placeholder 2"/>
+          <p:cNvSpPr txBox="1">
+            <a:spLocks/>
+          </p:cNvSpPr>
+          <p:nvPr/>
+        </p:nvSpPr>
+        <p:spPr>
+          <a:xfrm>
+            <a:off x="377947" y="2844300"/>
+            <a:ext cx="5338974" cy="360554"/>
+          </a:xfrm>
+          <a:prstGeom prst="rect">
+            <a:avLst/>
+          </a:prstGeom>
+        </p:spPr>
+        <p:txBody>
+          <a:bodyPr>
+            <a:normAutofit/>
+          </a:bodyPr>
+          <a:lstStyle>
+            <a:lvl1pPr marL="342900" indent="-342900" algn="l" defTabSz="457200" rtl="0" eaLnBrk="1" latinLnBrk="0" hangingPunct="1">
+              <a:spcBef>
+                <a:spcPct val="20000"/>
+              </a:spcBef>
+              <a:buFont typeface="Arial"/>
+              <a:buChar char="•"/>
+              <a:defRPr sz="3200" kern="1200">
+                <a:solidFill>
+                  <a:schemeClr val="bg1"/>
+                </a:solidFill>
+                <a:latin typeface="Arial" panose="020B0604020202020204" pitchFamily="34" charset="0"/>
+                <a:ea typeface="+mn-ea"/>
+                <a:cs typeface="Arial" panose="020B0604020202020204" pitchFamily="34" charset="0"/>
+              </a:defRPr>
+            </a:lvl1pPr>
+            <a:lvl2pPr marL="742950" indent="-285750" algn="l" defTabSz="457200" rtl="0" eaLnBrk="1" latinLnBrk="0" hangingPunct="1">
+              <a:spcBef>
+                <a:spcPct val="20000"/>
+              </a:spcBef>
+              <a:buFont typeface="Arial"/>
+              <a:buChar char="–"/>
+              <a:defRPr sz="2800" kern="1200">
+                <a:solidFill>
+                  <a:schemeClr val="bg1"/>
+                </a:solidFill>
+                <a:latin typeface="Arial" panose="020B0604020202020204" pitchFamily="34" charset="0"/>
+                <a:ea typeface="+mn-ea"/>
+                <a:cs typeface="Arial" panose="020B0604020202020204" pitchFamily="34" charset="0"/>
+              </a:defRPr>
+            </a:lvl2pPr>
+            <a:lvl3pPr marL="1143000" indent="-228600" algn="l" defTabSz="457200" rtl="0" eaLnBrk="1" latinLnBrk="0" hangingPunct="1">
+              <a:spcBef>
+                <a:spcPct val="20000"/>
+              </a:spcBef>
+              <a:buFont typeface="Arial"/>
+              <a:buChar char="•"/>
+              <a:defRPr sz="2400" kern="1200">
+                <a:solidFill>
+                  <a:schemeClr val="bg1"/>
+                </a:solidFill>
+                <a:latin typeface="Arial" panose="020B0604020202020204" pitchFamily="34" charset="0"/>
+                <a:ea typeface="+mn-ea"/>
+                <a:cs typeface="Arial" panose="020B0604020202020204" pitchFamily="34" charset="0"/>
+              </a:defRPr>
+            </a:lvl3pPr>
+            <a:lvl4pPr marL="1600200" indent="-228600" algn="l" defTabSz="457200" rtl="0" eaLnBrk="1" latinLnBrk="0" hangingPunct="1">
+              <a:spcBef>
+                <a:spcPct val="20000"/>
+              </a:spcBef>
+              <a:buFont typeface="Arial"/>
+              <a:buChar char="–"/>
+              <a:defRPr sz="2000" kern="1200">
+                <a:solidFill>
+                  <a:schemeClr val="bg1"/>
+                </a:solidFill>
+                <a:latin typeface="Arial" panose="020B0604020202020204" pitchFamily="34" charset="0"/>
+                <a:ea typeface="+mn-ea"/>
+                <a:cs typeface="Arial" panose="020B0604020202020204" pitchFamily="34" charset="0"/>
+              </a:defRPr>
+            </a:lvl4pPr>
+            <a:lvl5pPr marL="2057400" indent="-228600" algn="l" defTabSz="457200" rtl="0" eaLnBrk="1" latinLnBrk="0" hangingPunct="1">
+              <a:spcBef>
+                <a:spcPct val="20000"/>
+              </a:spcBef>
+              <a:buFont typeface="Arial"/>
+              <a:buChar char="»"/>
+              <a:defRPr sz="2000" kern="1200">
+                <a:solidFill>
+                  <a:schemeClr val="bg1"/>
+                </a:solidFill>
+                <a:latin typeface="Arial" panose="020B0604020202020204" pitchFamily="34" charset="0"/>
+                <a:ea typeface="+mn-ea"/>
+                <a:cs typeface="Arial" panose="020B0604020202020204" pitchFamily="34" charset="0"/>
+              </a:defRPr>
+            </a:lvl5pPr>
+            <a:lvl6pPr marL="2514600" indent="-228600" algn="l" defTabSz="457200" rtl="0" eaLnBrk="1" latinLnBrk="0" hangingPunct="1">
+              <a:spcBef>
+                <a:spcPct val="20000"/>
+              </a:spcBef>
+              <a:buFont typeface="Arial"/>
+              <a:buChar char="•"/>
+              <a:defRPr sz="2000" kern="1200">
+                <a:solidFill>
+                  <a:schemeClr val="tx1"/>
+                </a:solidFill>
+                <a:latin typeface="+mn-lt"/>
+                <a:ea typeface="+mn-ea"/>
+                <a:cs typeface="+mn-cs"/>
+              </a:defRPr>
+            </a:lvl6pPr>
+            <a:lvl7pPr marL="2971800" indent="-228600" algn="l" defTabSz="457200" rtl="0" eaLnBrk="1" latinLnBrk="0" hangingPunct="1">
+              <a:spcBef>
+                <a:spcPct val="20000"/>
+              </a:spcBef>
+              <a:buFont typeface="Arial"/>
+              <a:buChar char="•"/>
+              <a:defRPr sz="2000" kern="1200">
+                <a:solidFill>
+                  <a:schemeClr val="tx1"/>
+                </a:solidFill>
+                <a:latin typeface="+mn-lt"/>
+                <a:ea typeface="+mn-ea"/>
+                <a:cs typeface="+mn-cs"/>
+              </a:defRPr>
+            </a:lvl7pPr>
+            <a:lvl8pPr marL="3429000" indent="-228600" algn="l" defTabSz="457200" rtl="0" eaLnBrk="1" latinLnBrk="0" hangingPunct="1">
+              <a:spcBef>
+                <a:spcPct val="20000"/>
+              </a:spcBef>
+              <a:buFont typeface="Arial"/>
+              <a:buChar char="•"/>
+              <a:defRPr sz="2000" kern="1200">
+                <a:solidFill>
+                  <a:schemeClr val="tx1"/>
+                </a:solidFill>
+                <a:latin typeface="+mn-lt"/>
+                <a:ea typeface="+mn-ea"/>
+                <a:cs typeface="+mn-cs"/>
+              </a:defRPr>
+            </a:lvl8pPr>
+            <a:lvl9pPr marL="3886200" indent="-228600" algn="l" defTabSz="457200" rtl="0" eaLnBrk="1" latinLnBrk="0" hangingPunct="1">
+              <a:spcBef>
+                <a:spcPct val="20000"/>
+              </a:spcBef>
+              <a:buFont typeface="Arial"/>
+              <a:buChar char="•"/>
+              <a:defRPr sz="2000" kern="1200">
+                <a:solidFill>
+                  <a:schemeClr val="tx1"/>
+                </a:solidFill>
+                <a:latin typeface="+mn-lt"/>
+                <a:ea typeface="+mn-ea"/>
+                <a:cs typeface="+mn-cs"/>
+              </a:defRPr>
+            </a:lvl9pPr>
+          </a:lstStyle>
+          <a:p>
+            <a:pPr marL="0" indent="0">
+              <a:buFont typeface="Arial"/>
+              <a:buNone/>
+            </a:pPr>
             <a:r>
-              <a:rPr lang="en-US" sz="1400" dirty="0" smtClean="0"/>
-              <a:t>Add a dash of Spring Data REST starter into our </a:t>
+              <a:rPr lang="en-US" sz="1400" dirty="0"/>
+              <a:t>Let’s create a JPA </a:t>
             </a:r>
             <a:r>
-              <a:rPr lang="en-US" sz="1400" dirty="0" err="1" smtClean="0"/>
-              <a:t>build.gradle</a:t>
+              <a:rPr lang="en-US" sz="1400" b="1" dirty="0"/>
+              <a:t>Repository</a:t>
             </a:r>
             <a:r>
-              <a:rPr lang="en-US" sz="1400" dirty="0" smtClean="0"/>
-              <a:t> file</a:t>
+              <a:rPr lang="en-US" sz="1400" dirty="0"/>
+              <a:t> resource to manage our @Entity</a:t>
             </a:r>
           </a:p>
         </p:txBody>
       </p:sp>
       <p:pic>
         <p:nvPicPr>
-          <p:cNvPr id="3" name="Picture 2"/>
+          <p:cNvPr id="9" name="Picture 8">
+            <a:extLst>
+              <a:ext uri="{FF2B5EF4-FFF2-40B4-BE49-F238E27FC236}">
+                <a16:creationId xmlns:a16="http://schemas.microsoft.com/office/drawing/2014/main" id="{D5583E4C-81B5-954D-9A01-FB8947F94B8A}"/>
+              </a:ext>
+            </a:extLst>
+          </p:cNvPr>
           <p:cNvPicPr>
             <a:picLocks noChangeAspect="1"/>
           </p:cNvPicPr>
           <p:nvPr/>
         </p:nvPicPr>
         <p:blipFill>
-          <a:blip r:embed="rId3">
-            <a:extLst>
-              <a:ext uri="{28A0092B-C50C-407E-A947-70E740481C1C}">
-                <a14:useLocalDpi xmlns:a14="http://schemas.microsoft.com/office/drawing/2010/main" val="0"/>
-              </a:ext>
-            </a:extLst>
-          </a:blip>
+          <a:blip r:embed="rId3"/>
           <a:stretch>
             <a:fillRect/>
           </a:stretch>
         </p:blipFill>
         <p:spPr>
           <a:xfrm>
-            <a:off x="3235960" y="2906789"/>
-            <a:ext cx="5593080" cy="811375"/>
+            <a:off x="6260664" y="1108075"/>
+            <a:ext cx="2568376" cy="3402964"/>
           </a:xfrm>
           <a:prstGeom prst="rect">
             <a:avLst/>
           </a:prstGeom>
         </p:spPr>
       </p:pic>
+      <p:pic>
+        <p:nvPicPr>
+          <p:cNvPr id="12" name="Picture 11">
+            <a:extLst>
+              <a:ext uri="{FF2B5EF4-FFF2-40B4-BE49-F238E27FC236}">
+                <a16:creationId xmlns:a16="http://schemas.microsoft.com/office/drawing/2014/main" id="{97A79C73-FC15-D949-81DD-57F95671B4EB}"/>
+              </a:ext>
+            </a:extLst>
+          </p:cNvPr>
+          <p:cNvPicPr>
+            <a:picLocks noChangeAspect="1"/>
+          </p:cNvPicPr>
+          <p:nvPr/>
+        </p:nvPicPr>
+        <p:blipFill>
+          <a:blip r:embed="rId4"/>
+          <a:stretch>
+            <a:fillRect/>
+          </a:stretch>
+        </p:blipFill>
+        <p:spPr>
+          <a:xfrm>
+            <a:off x="457199" y="3680150"/>
+            <a:ext cx="4282866" cy="467976"/>
+          </a:xfrm>
+          <a:prstGeom prst="rect">
+            <a:avLst/>
+          </a:prstGeom>
+        </p:spPr>
+      </p:pic>
+      <p:cxnSp>
+        <p:nvCxnSpPr>
+          <p:cNvPr id="14" name="Straight Arrow Connector 13">
+            <a:extLst>
+              <a:ext uri="{FF2B5EF4-FFF2-40B4-BE49-F238E27FC236}">
+                <a16:creationId xmlns:a16="http://schemas.microsoft.com/office/drawing/2014/main" id="{7A8196D6-30E1-8840-A59F-1C5934475B35}"/>
+              </a:ext>
+            </a:extLst>
+          </p:cNvPr>
+          <p:cNvCxnSpPr/>
+          <p:nvPr/>
+        </p:nvCxnSpPr>
+        <p:spPr>
+          <a:xfrm flipH="1">
+            <a:off x="5517136" y="1321654"/>
+            <a:ext cx="743528" cy="0"/>
+          </a:xfrm>
+          <a:prstGeom prst="straightConnector1">
+            <a:avLst/>
+          </a:prstGeom>
+          <a:ln>
+            <a:tailEnd type="triangle"/>
+          </a:ln>
+        </p:spPr>
+        <p:style>
+          <a:lnRef idx="2">
+            <a:schemeClr val="accent1"/>
+          </a:lnRef>
+          <a:fillRef idx="0">
+            <a:schemeClr val="accent1"/>
+          </a:fillRef>
+          <a:effectRef idx="1">
+            <a:schemeClr val="accent1"/>
+          </a:effectRef>
+          <a:fontRef idx="minor">
+            <a:schemeClr val="tx1"/>
+          </a:fontRef>
+        </p:style>
+      </p:cxnSp>
+      <p:cxnSp>
+        <p:nvCxnSpPr>
+          <p:cNvPr id="16" name="Straight Arrow Connector 15">
+            <a:extLst>
+              <a:ext uri="{FF2B5EF4-FFF2-40B4-BE49-F238E27FC236}">
+                <a16:creationId xmlns:a16="http://schemas.microsoft.com/office/drawing/2014/main" id="{83D2D165-EBF5-8A46-A7FA-7C902FC1BC65}"/>
+              </a:ext>
+            </a:extLst>
+          </p:cNvPr>
+          <p:cNvCxnSpPr/>
+          <p:nvPr/>
+        </p:nvCxnSpPr>
+        <p:spPr>
+          <a:xfrm flipH="1" flipV="1">
+            <a:off x="737667" y="3119718"/>
+            <a:ext cx="253573" cy="614722"/>
+          </a:xfrm>
+          <a:prstGeom prst="straightConnector1">
+            <a:avLst/>
+          </a:prstGeom>
+          <a:ln>
+            <a:tailEnd type="triangle"/>
+          </a:ln>
+        </p:spPr>
+        <p:style>
+          <a:lnRef idx="2">
+            <a:schemeClr val="accent1"/>
+          </a:lnRef>
+          <a:fillRef idx="0">
+            <a:schemeClr val="accent1"/>
+          </a:fillRef>
+          <a:effectRef idx="1">
+            <a:schemeClr val="accent1"/>
+          </a:effectRef>
+          <a:fontRef idx="minor">
+            <a:schemeClr val="tx1"/>
+          </a:fontRef>
+        </p:style>
+      </p:cxnSp>
     </p:spTree>
     <p:extLst>
       <p:ext uri="{BB962C8B-B14F-4D97-AF65-F5344CB8AC3E}">
-        <p14:creationId xmlns:p14="http://schemas.microsoft.com/office/powerpoint/2010/main" val="2204368881"/>
+        <p14:creationId xmlns:p14="http://schemas.microsoft.com/office/powerpoint/2010/main" val="2742572485"/>
       </p:ext>
     </p:extLst>
   </p:cSld>
   <p:clrMapOvr>
     <a:masterClrMapping/>
   </p:clrMapOvr>
-  <mc:AlternateContent xmlns:mc="http://schemas.openxmlformats.org/markup-compatibility/2006" xmlns:p14="http://schemas.microsoft.com/office/powerpoint/2010/main">
-    <mc:Choice Requires="p14">
-      <p:transition spd="slow" p14:dur="2000"/>
-    </mc:Choice>
-    <mc:Fallback xmlns="">
-      <p:transition xmlns:p14="http://schemas.microsoft.com/office/powerpoint/2010/main" spd="slow"/>
-    </mc:Fallback>
-  </mc:AlternateContent>
-  <p:timing>
-    <p:tnLst>
-      <p:par>
-        <p:cTn id="1" dur="indefinite" restart="never" nodeType="tmRoot"/>
-      </p:par>
-    </p:tnLst>
-  </p:timing>
 </p:sld>
 </file>
 
@@ -9969,7 +9781,7 @@
           <a:lstStyle/>
           <a:p>
             <a:r>
-              <a:rPr lang="en-US" dirty="0" smtClean="0"/>
+              <a:rPr lang="en-US" dirty="0"/>
               <a:t>Spring Data REST, what happens</a:t>
             </a:r>
             <a:endParaRPr lang="en-US" dirty="0">
@@ -10143,7 +9955,7 @@
               <a:buFont typeface="Arial"/>
               <a:buNone/>
             </a:pPr>
-            <a:endParaRPr lang="en-US" sz="1400" dirty="0" smtClean="0"/>
+            <a:endParaRPr lang="en-US" sz="1400" dirty="0"/>
           </a:p>
         </p:txBody>
       </p:sp>
@@ -10204,31 +10016,7 @@
                   <a:srgbClr val="FFFFFF"/>
                 </a:solidFill>
               </a:rPr>
-              <a:t>For this repository, Spring Data </a:t>
-            </a:r>
-            <a:r>
-              <a:rPr lang="en-US" sz="1400" dirty="0" smtClean="0">
-                <a:solidFill>
-                  <a:srgbClr val="FFFFFF"/>
-                </a:solidFill>
-              </a:rPr>
-              <a:t>REST exposes </a:t>
-            </a:r>
-            <a:r>
-              <a:rPr lang="en-US" sz="1400" dirty="0">
-                <a:solidFill>
-                  <a:srgbClr val="FFFFFF"/>
-                </a:solidFill>
-              </a:rPr>
-              <a:t>a resource collection at “</a:t>
-            </a:r>
-            <a:r>
-              <a:rPr lang="en-US" sz="1400" dirty="0" smtClean="0">
-                <a:solidFill>
-                  <a:srgbClr val="FFFFFF"/>
-                </a:solidFill>
-              </a:rPr>
-              <a:t>/cities”</a:t>
+              <a:t>For this repository, Spring Data REST exposes a resource collection at “/cities”</a:t>
             </a:r>
           </a:p>
           <a:p>
@@ -10238,20 +10026,12 @@
               </a:lnSpc>
             </a:pPr>
             <a:r>
-              <a:rPr lang="en-US" sz="1400" dirty="0" smtClean="0">
+              <a:rPr lang="en-US" sz="1400" dirty="0">
                 <a:solidFill>
                   <a:srgbClr val="FFFFFF"/>
                 </a:solidFill>
               </a:rPr>
-              <a:t>Context path </a:t>
-            </a:r>
-            <a:r>
-              <a:rPr lang="en-US" sz="1400" dirty="0">
-                <a:solidFill>
-                  <a:srgbClr val="FFFFFF"/>
-                </a:solidFill>
-              </a:rPr>
-              <a:t>is </a:t>
+              <a:t>Context path is </a:t>
             </a:r>
             <a:r>
               <a:rPr lang="en-US" sz="1400" u="sng" dirty="0">
@@ -10270,7 +10050,7 @@
               <a:t> from the </a:t>
             </a:r>
             <a:r>
-              <a:rPr lang="en-US" sz="1400" i="1" dirty="0" smtClean="0">
+              <a:rPr lang="en-US" sz="1400" i="1" dirty="0">
                 <a:solidFill>
                   <a:srgbClr val="FFFFFF"/>
                 </a:solidFill>
@@ -10315,15 +10095,7 @@
                   <a:srgbClr val="FFFFFF"/>
                 </a:solidFill>
               </a:rPr>
-              <a:t> of the domain class being </a:t>
-            </a:r>
-            <a:r>
-              <a:rPr lang="en-US" sz="1400" dirty="0" smtClean="0">
-                <a:solidFill>
-                  <a:srgbClr val="FFFFFF"/>
-                </a:solidFill>
-              </a:rPr>
-              <a:t>managed</a:t>
+              <a:t> of the domain class being managed</a:t>
             </a:r>
           </a:p>
           <a:p>
@@ -10333,56 +10105,19 @@
               </a:lnSpc>
             </a:pPr>
             <a:r>
-              <a:rPr lang="en-US" sz="1400" dirty="0" smtClean="0">
+              <a:rPr lang="en-US" sz="1400" dirty="0">
                 <a:solidFill>
                   <a:srgbClr val="FFFFFF"/>
                 </a:solidFill>
               </a:rPr>
-              <a:t>Exposes </a:t>
+              <a:t>Exposes an item resource for each of these items managed by the repository under the URI template /cities/{id}</a:t>
             </a:r>
-            <a:r>
-              <a:rPr lang="en-US" sz="1400" dirty="0">
-                <a:solidFill>
-                  <a:srgbClr val="FFFFFF"/>
-                </a:solidFill>
-              </a:rPr>
-              <a:t>an item resource for each of these items managed by the repository under the URI template </a:t>
-            </a:r>
-            <a:r>
-              <a:rPr lang="en-US" sz="1400" dirty="0" smtClean="0">
-                <a:solidFill>
-                  <a:srgbClr val="FFFFFF"/>
-                </a:solidFill>
-              </a:rPr>
-              <a:t>/cities/</a:t>
-            </a:r>
-            <a:r>
-              <a:rPr lang="en-US" sz="1400" dirty="0">
-                <a:solidFill>
-                  <a:srgbClr val="FFFFFF"/>
-                </a:solidFill>
-              </a:rPr>
-              <a:t>{id</a:t>
-            </a:r>
-            <a:r>
-              <a:rPr lang="en-US" sz="1400" dirty="0" smtClean="0">
-                <a:solidFill>
-                  <a:srgbClr val="FFFFFF"/>
-                </a:solidFill>
-              </a:rPr>
-              <a:t>}</a:t>
-            </a:r>
-            <a:endParaRPr lang="en-US" sz="1400" dirty="0">
-              <a:solidFill>
-                <a:srgbClr val="FFFFFF"/>
-              </a:solidFill>
-            </a:endParaRPr>
           </a:p>
           <a:p>
             <a:pPr marL="0" indent="0">
               <a:buNone/>
             </a:pPr>
-            <a:endParaRPr lang="en-US" sz="1400" dirty="0" smtClean="0"/>
+            <a:endParaRPr lang="en-US" sz="1400" dirty="0"/>
           </a:p>
         </p:txBody>
       </p:sp>
@@ -10396,21 +10131,6 @@
   <p:clrMapOvr>
     <a:masterClrMapping/>
   </p:clrMapOvr>
-  <mc:AlternateContent xmlns:mc="http://schemas.openxmlformats.org/markup-compatibility/2006" xmlns:p14="http://schemas.microsoft.com/office/powerpoint/2010/main">
-    <mc:Choice Requires="p14">
-      <p:transition spd="slow" p14:dur="2000"/>
-    </mc:Choice>
-    <mc:Fallback xmlns="">
-      <p:transition xmlns:p14="http://schemas.microsoft.com/office/powerpoint/2010/main" spd="slow"/>
-    </mc:Fallback>
-  </mc:AlternateContent>
-  <p:timing>
-    <p:tnLst>
-      <p:par>
-        <p:cTn id="1" dur="indefinite" restart="never" nodeType="tmRoot"/>
-      </p:par>
-    </p:tnLst>
-  </p:timing>
 </p:sld>
 </file>
 
@@ -10447,7 +10167,7 @@
           <a:lstStyle/>
           <a:p>
             <a:r>
-              <a:rPr lang="en-US" dirty="0" smtClean="0"/>
+              <a:rPr lang="en-US" dirty="0"/>
               <a:t>Support Search, or findBy*</a:t>
             </a:r>
             <a:endParaRPr lang="en-US" dirty="0">
@@ -10621,7 +10341,7 @@
               <a:buFont typeface="Arial"/>
               <a:buNone/>
             </a:pPr>
-            <a:endParaRPr lang="en-US" sz="1400" dirty="0" smtClean="0"/>
+            <a:endParaRPr lang="en-US" sz="1400" dirty="0"/>
           </a:p>
         </p:txBody>
       </p:sp>
@@ -10635,8 +10355,8 @@
         </p:nvSpPr>
         <p:spPr>
           <a:xfrm>
-            <a:off x="193039" y="1036321"/>
-            <a:ext cx="8036561" cy="914399"/>
+            <a:off x="706931" y="1036321"/>
+            <a:ext cx="7522669" cy="914399"/>
           </a:xfrm>
           <a:prstGeom prst="rect">
             <a:avLst/>
@@ -10789,15 +10509,45 @@
               <a:buNone/>
             </a:pPr>
             <a:r>
-              <a:rPr lang="en-US" sz="1400" dirty="0" smtClean="0"/>
-              <a:t>Add some search methods using @RestResource to our CityRepository class</a:t>
+              <a:rPr lang="en-US" sz="1400" dirty="0"/>
+              <a:t>Add some search methods using </a:t>
+            </a:r>
+            <a:r>
+              <a:rPr lang="en-US" sz="1400" b="1" dirty="0"/>
+              <a:t>@</a:t>
+            </a:r>
+            <a:r>
+              <a:rPr lang="en-US" sz="1400" b="1" dirty="0" err="1"/>
+              <a:t>RepositoryRestResource</a:t>
+            </a:r>
+            <a:r>
+              <a:rPr lang="en-US" sz="1400" b="1" dirty="0"/>
+              <a:t> </a:t>
+            </a:r>
+            <a:r>
+              <a:rPr lang="en-US" sz="1400" dirty="0"/>
+              <a:t>to our </a:t>
+            </a:r>
+            <a:r>
+              <a:rPr lang="en-US" sz="1400" b="1" dirty="0"/>
+              <a:t>CityRepository</a:t>
+            </a:r>
+            <a:r>
+              <a:rPr lang="en-US" sz="1400" dirty="0"/>
+              <a:t> class</a:t>
             </a:r>
           </a:p>
         </p:txBody>
       </p:sp>
       <p:pic>
         <p:nvPicPr>
-          <p:cNvPr id="6" name="Picture 5"/>
+          <p:cNvPr id="4" name="Picture 3">
+            <a:extLst>
+              <a:ext uri="{FF2B5EF4-FFF2-40B4-BE49-F238E27FC236}">
+                <a16:creationId xmlns:a16="http://schemas.microsoft.com/office/drawing/2014/main" id="{157D9ACC-F731-A74C-892D-3A48FE072A5E}"/>
+              </a:ext>
+            </a:extLst>
+          </p:cNvPr>
           <p:cNvPicPr>
             <a:picLocks noChangeAspect="1"/>
           </p:cNvPicPr>
@@ -10811,8 +10561,8 @@
         </p:blipFill>
         <p:spPr>
           <a:xfrm>
-            <a:off x="721360" y="1625599"/>
-            <a:ext cx="7508240" cy="2545763"/>
+            <a:off x="1759642" y="1524256"/>
+            <a:ext cx="5081021" cy="2726558"/>
           </a:xfrm>
           <a:prstGeom prst="rect">
             <a:avLst/>
@@ -10829,21 +10579,6 @@
   <p:clrMapOvr>
     <a:masterClrMapping/>
   </p:clrMapOvr>
-  <mc:AlternateContent xmlns:mc="http://schemas.openxmlformats.org/markup-compatibility/2006" xmlns:p14="http://schemas.microsoft.com/office/powerpoint/2010/main">
-    <mc:Choice Requires="p14">
-      <p:transition spd="slow" p14:dur="2000"/>
-    </mc:Choice>
-    <mc:Fallback xmlns="">
-      <p:transition xmlns:p14="http://schemas.microsoft.com/office/powerpoint/2010/main" spd="slow"/>
-    </mc:Fallback>
-  </mc:AlternateContent>
-  <p:timing>
-    <p:tnLst>
-      <p:par>
-        <p:cTn id="1" dur="indefinite" restart="never" nodeType="tmRoot"/>
-      </p:par>
-    </p:tnLst>
-  </p:timing>
 </p:sld>
 </file>
 
@@ -10880,7 +10615,7 @@
           <a:lstStyle/>
           <a:p>
             <a:r>
-              <a:rPr lang="en-US" dirty="0" smtClean="0"/>
+              <a:rPr lang="en-US" dirty="0"/>
               <a:t>Spring Data REST, what happens?</a:t>
             </a:r>
             <a:endParaRPr lang="en-US" dirty="0">
@@ -11054,7 +10789,7 @@
               <a:buFont typeface="Arial"/>
               <a:buNone/>
             </a:pPr>
-            <a:endParaRPr lang="en-US" sz="1400" dirty="0" smtClean="0"/>
+            <a:endParaRPr lang="en-US" sz="1400" dirty="0"/>
           </a:p>
         </p:txBody>
       </p:sp>
@@ -11092,27 +10827,14 @@
                   <a:srgbClr val="FFFFFF"/>
                 </a:solidFill>
               </a:rPr>
-              <a:t>For this repository, </a:t>
+              <a:t>For this repository, we now see search methods when we hit the /{repository}/search endpoint</a:t>
             </a:r>
-            <a:r>
-              <a:rPr lang="en-US" sz="1400" dirty="0" smtClean="0">
-                <a:solidFill>
-                  <a:srgbClr val="FFFFFF"/>
-                </a:solidFill>
-              </a:rPr>
-              <a:t>we now see search methods when we hit the /{repository}/search endpoint</a:t>
-            </a:r>
-            <a:endParaRPr lang="en-US" sz="1400" dirty="0">
-              <a:solidFill>
-                <a:srgbClr val="FFFFFF"/>
-              </a:solidFill>
-            </a:endParaRPr>
           </a:p>
           <a:p>
             <a:pPr marL="0" indent="0">
               <a:buNone/>
             </a:pPr>
-            <a:endParaRPr lang="en-US" sz="1400" dirty="0" smtClean="0"/>
+            <a:endParaRPr lang="en-US" sz="1400" dirty="0"/>
           </a:p>
         </p:txBody>
       </p:sp>
@@ -11150,21 +10872,6 @@
   <p:clrMapOvr>
     <a:masterClrMapping/>
   </p:clrMapOvr>
-  <mc:AlternateContent xmlns:mc="http://schemas.openxmlformats.org/markup-compatibility/2006" xmlns:p14="http://schemas.microsoft.com/office/powerpoint/2010/main">
-    <mc:Choice Requires="p14">
-      <p:transition spd="slow" p14:dur="2000"/>
-    </mc:Choice>
-    <mc:Fallback xmlns="">
-      <p:transition xmlns:p14="http://schemas.microsoft.com/office/powerpoint/2010/main" spd="slow"/>
-    </mc:Fallback>
-  </mc:AlternateContent>
-  <p:timing>
-    <p:tnLst>
-      <p:par>
-        <p:cTn id="1" dur="indefinite" restart="never" nodeType="tmRoot"/>
-      </p:par>
-    </p:tnLst>
-  </p:timing>
 </p:sld>
 </file>
 
@@ -11201,7 +10908,7 @@
           <a:lstStyle/>
           <a:p>
             <a:r>
-              <a:rPr lang="en-US" dirty="0" smtClean="0"/>
+              <a:rPr lang="en-US" dirty="0"/>
               <a:t>Spring Data REST, Custom Queries</a:t>
             </a:r>
             <a:endParaRPr lang="en-US" dirty="0">
@@ -11375,7 +11082,7 @@
               <a:buFont typeface="Arial"/>
               <a:buNone/>
             </a:pPr>
-            <a:endParaRPr lang="en-US" sz="1400" dirty="0" smtClean="0"/>
+            <a:endParaRPr lang="en-US" sz="1400" dirty="0"/>
           </a:p>
         </p:txBody>
       </p:sp>
@@ -11405,7 +11112,7 @@
               <a:buNone/>
             </a:pPr>
             <a:r>
-              <a:rPr lang="en-US" sz="1400" dirty="0" smtClean="0"/>
+              <a:rPr lang="en-US" sz="1400" dirty="0"/>
               <a:t>Add a method “findByStateCode” to our CityRepository that defines an custom query using @Query notation and takes an @Param argument for the stateCode</a:t>
             </a:r>
           </a:p>
@@ -11445,21 +11152,6 @@
   <p:clrMapOvr>
     <a:masterClrMapping/>
   </p:clrMapOvr>
-  <mc:AlternateContent xmlns:mc="http://schemas.openxmlformats.org/markup-compatibility/2006" xmlns:p14="http://schemas.microsoft.com/office/powerpoint/2010/main">
-    <mc:Choice Requires="p14">
-      <p:transition spd="slow" p14:dur="2000"/>
-    </mc:Choice>
-    <mc:Fallback xmlns="">
-      <p:transition xmlns:p14="http://schemas.microsoft.com/office/powerpoint/2010/main" spd="slow"/>
-    </mc:Fallback>
-  </mc:AlternateContent>
-  <p:timing>
-    <p:tnLst>
-      <p:par>
-        <p:cTn id="1" dur="indefinite" restart="never" nodeType="tmRoot"/>
-      </p:par>
-    </p:tnLst>
-  </p:timing>
 </p:sld>
 </file>
 

</xml_diff>